<commit_message>
removed dashed lines from fig 1
</commit_message>
<xml_diff>
--- a/Plots/Sex_determination_outline.pptx
+++ b/Plots/Sex_determination_outline.pptx
@@ -243,7 +243,7 @@
           <a:p>
             <a:fld id="{C437F6A3-4B0E-974E-8C94-07C070FFF74A}" type="datetimeFigureOut">
               <a:rPr lang="en-US" smtClean="0"/>
-              <a:t>11/29/17</a:t>
+              <a:t>12/1/17</a:t>
             </a:fld>
             <a:endParaRPr lang="en-US"/>
           </a:p>
@@ -408,7 +408,7 @@
           <a:p>
             <a:fld id="{C437F6A3-4B0E-974E-8C94-07C070FFF74A}" type="datetimeFigureOut">
               <a:rPr lang="en-US" smtClean="0"/>
-              <a:t>11/29/17</a:t>
+              <a:t>12/1/17</a:t>
             </a:fld>
             <a:endParaRPr lang="en-US"/>
           </a:p>
@@ -583,7 +583,7 @@
           <a:p>
             <a:fld id="{C437F6A3-4B0E-974E-8C94-07C070FFF74A}" type="datetimeFigureOut">
               <a:rPr lang="en-US" smtClean="0"/>
-              <a:t>11/29/17</a:t>
+              <a:t>12/1/17</a:t>
             </a:fld>
             <a:endParaRPr lang="en-US"/>
           </a:p>
@@ -748,7 +748,7 @@
           <a:p>
             <a:fld id="{C437F6A3-4B0E-974E-8C94-07C070FFF74A}" type="datetimeFigureOut">
               <a:rPr lang="en-US" smtClean="0"/>
-              <a:t>11/29/17</a:t>
+              <a:t>12/1/17</a:t>
             </a:fld>
             <a:endParaRPr lang="en-US"/>
           </a:p>
@@ -987,7 +987,7 @@
           <a:p>
             <a:fld id="{C437F6A3-4B0E-974E-8C94-07C070FFF74A}" type="datetimeFigureOut">
               <a:rPr lang="en-US" smtClean="0"/>
-              <a:t>11/29/17</a:t>
+              <a:t>12/1/17</a:t>
             </a:fld>
             <a:endParaRPr lang="en-US"/>
           </a:p>
@@ -1214,7 +1214,7 @@
           <a:p>
             <a:fld id="{C437F6A3-4B0E-974E-8C94-07C070FFF74A}" type="datetimeFigureOut">
               <a:rPr lang="en-US" smtClean="0"/>
-              <a:t>11/29/17</a:t>
+              <a:t>12/1/17</a:t>
             </a:fld>
             <a:endParaRPr lang="en-US"/>
           </a:p>
@@ -1576,7 +1576,7 @@
           <a:p>
             <a:fld id="{C437F6A3-4B0E-974E-8C94-07C070FFF74A}" type="datetimeFigureOut">
               <a:rPr lang="en-US" smtClean="0"/>
-              <a:t>11/29/17</a:t>
+              <a:t>12/1/17</a:t>
             </a:fld>
             <a:endParaRPr lang="en-US"/>
           </a:p>
@@ -1689,7 +1689,7 @@
           <a:p>
             <a:fld id="{C437F6A3-4B0E-974E-8C94-07C070FFF74A}" type="datetimeFigureOut">
               <a:rPr lang="en-US" smtClean="0"/>
-              <a:t>11/29/17</a:t>
+              <a:t>12/1/17</a:t>
             </a:fld>
             <a:endParaRPr lang="en-US"/>
           </a:p>
@@ -1779,7 +1779,7 @@
           <a:p>
             <a:fld id="{C437F6A3-4B0E-974E-8C94-07C070FFF74A}" type="datetimeFigureOut">
               <a:rPr lang="en-US" smtClean="0"/>
-              <a:t>11/29/17</a:t>
+              <a:t>12/1/17</a:t>
             </a:fld>
             <a:endParaRPr lang="en-US"/>
           </a:p>
@@ -2051,7 +2051,7 @@
           <a:p>
             <a:fld id="{C437F6A3-4B0E-974E-8C94-07C070FFF74A}" type="datetimeFigureOut">
               <a:rPr lang="en-US" smtClean="0"/>
-              <a:t>11/29/17</a:t>
+              <a:t>12/1/17</a:t>
             </a:fld>
             <a:endParaRPr lang="en-US"/>
           </a:p>
@@ -2303,7 +2303,7 @@
           <a:p>
             <a:fld id="{C437F6A3-4B0E-974E-8C94-07C070FFF74A}" type="datetimeFigureOut">
               <a:rPr lang="en-US" smtClean="0"/>
-              <a:t>11/29/17</a:t>
+              <a:t>12/1/17</a:t>
             </a:fld>
             <a:endParaRPr lang="en-US"/>
           </a:p>
@@ -2511,7 +2511,7 @@
           <a:p>
             <a:fld id="{C437F6A3-4B0E-974E-8C94-07C070FFF74A}" type="datetimeFigureOut">
               <a:rPr lang="en-US" smtClean="0"/>
-              <a:t>11/29/17</a:t>
+              <a:t>12/1/17</a:t>
             </a:fld>
             <a:endParaRPr lang="en-US"/>
           </a:p>
@@ -3006,7 +3006,6 @@
                 <a:rPr lang="en-US" sz="960" b="1" dirty="0"/>
                 <a:t>W</a:t>
               </a:r>
-              <a:endParaRPr lang="en-US" sz="960" b="1" dirty="0"/>
             </a:p>
           </p:txBody>
         </p:sp>
@@ -3310,7 +3309,6 @@
                 <a:rPr lang="en-US" sz="960" b="1" dirty="0"/>
                 <a:t>X</a:t>
               </a:r>
-              <a:endParaRPr lang="en-US" sz="960" b="1" dirty="0"/>
             </a:p>
           </p:txBody>
         </p:sp>
@@ -4020,13 +4018,8 @@
             <a:p>
               <a:r>
                 <a:rPr lang="en-US" sz="700" dirty="0"/>
-                <a:t>d</a:t>
+                <a:t>diploid adults</a:t>
               </a:r>
-              <a:r>
-                <a:rPr lang="en-US" sz="700" dirty="0"/>
-                <a:t>iploid adults</a:t>
-              </a:r>
-              <a:endParaRPr lang="en-US" sz="700" dirty="0"/>
             </a:p>
           </p:txBody>
         </p:sp>
@@ -4054,11 +4047,7 @@
             <a:p>
               <a:r>
                 <a:rPr lang="en-US" sz="700" dirty="0"/>
-                <a:t>g</a:t>
-              </a:r>
-              <a:r>
-                <a:rPr lang="en-US" sz="700" dirty="0"/>
-                <a:t>ametes/</a:t>
+                <a:t>gametes/</a:t>
               </a:r>
             </a:p>
             <a:p>
@@ -4066,7 +4055,6 @@
                 <a:rPr lang="en-US" sz="700" dirty="0"/>
                 <a:t>gametophytes</a:t>
               </a:r>
-              <a:endParaRPr lang="en-US" sz="700" dirty="0"/>
             </a:p>
           </p:txBody>
         </p:sp>
@@ -4096,7 +4084,6 @@
                 <a:rPr lang="en-US" sz="700" dirty="0"/>
                 <a:t>zygotes</a:t>
               </a:r>
-              <a:endParaRPr lang="en-US" sz="700" dirty="0"/>
             </a:p>
           </p:txBody>
         </p:sp>
@@ -4751,43 +4738,6 @@
             <a:chExt cx="1609730" cy="975622"/>
           </a:xfrm>
         </p:grpSpPr>
-        <p:cxnSp>
-          <p:nvCxnSpPr>
-            <p:cNvPr id="371" name="Straight Arrow Connector 370"/>
-            <p:cNvCxnSpPr/>
-            <p:nvPr/>
-          </p:nvCxnSpPr>
-          <p:spPr>
-            <a:xfrm flipV="1">
-              <a:off x="3271272" y="3628119"/>
-              <a:ext cx="294939" cy="2"/>
-            </a:xfrm>
-            <a:prstGeom prst="straightConnector1">
-              <a:avLst/>
-            </a:prstGeom>
-            <a:ln w="12700">
-              <a:solidFill>
-                <a:schemeClr val="tx1"/>
-              </a:solidFill>
-              <a:prstDash val="sysDash"/>
-              <a:tailEnd type="none" w="sm" len="sm"/>
-            </a:ln>
-          </p:spPr>
-          <p:style>
-            <a:lnRef idx="1">
-              <a:schemeClr val="accent1"/>
-            </a:lnRef>
-            <a:fillRef idx="0">
-              <a:schemeClr val="accent1"/>
-            </a:fillRef>
-            <a:effectRef idx="0">
-              <a:schemeClr val="accent1"/>
-            </a:effectRef>
-            <a:fontRef idx="minor">
-              <a:schemeClr val="tx1"/>
-            </a:fontRef>
-          </p:style>
-        </p:cxnSp>
         <p:sp>
           <p:nvSpPr>
             <p:cNvPr id="372" name="TextBox 371"/>
@@ -4878,43 +4828,6 @@
             </a:p>
           </p:txBody>
         </p:sp>
-        <p:cxnSp>
-          <p:nvCxnSpPr>
-            <p:cNvPr id="375" name="Straight Arrow Connector 374"/>
-            <p:cNvCxnSpPr/>
-            <p:nvPr/>
-          </p:nvCxnSpPr>
-          <p:spPr>
-            <a:xfrm flipV="1">
-              <a:off x="3858055" y="3628117"/>
-              <a:ext cx="294939" cy="2"/>
-            </a:xfrm>
-            <a:prstGeom prst="straightConnector1">
-              <a:avLst/>
-            </a:prstGeom>
-            <a:ln w="12700">
-              <a:solidFill>
-                <a:schemeClr val="tx1"/>
-              </a:solidFill>
-              <a:prstDash val="sysDash"/>
-              <a:tailEnd type="none" w="sm" len="sm"/>
-            </a:ln>
-          </p:spPr>
-          <p:style>
-            <a:lnRef idx="1">
-              <a:schemeClr val="accent1"/>
-            </a:lnRef>
-            <a:fillRef idx="0">
-              <a:schemeClr val="accent1"/>
-            </a:fillRef>
-            <a:effectRef idx="0">
-              <a:schemeClr val="accent1"/>
-            </a:effectRef>
-            <a:fontRef idx="minor">
-              <a:schemeClr val="tx1"/>
-            </a:fontRef>
-          </p:style>
-        </p:cxnSp>
         <p:cxnSp>
           <p:nvCxnSpPr>
             <p:cNvPr id="376" name="Straight Arrow Connector 375"/>
@@ -5607,7 +5520,6 @@
                 <a:rPr lang="en-US" sz="1000" b="1" dirty="0"/>
                 <a:t>MM</a:t>
               </a:r>
-              <a:endParaRPr lang="en-US" sz="1000" b="1" dirty="0"/>
             </a:p>
           </p:txBody>
         </p:sp>
@@ -5695,7 +5607,6 @@
                 <a:rPr lang="en-US" sz="1000" b="1" dirty="0"/>
                 <a:t>Mm</a:t>
               </a:r>
-              <a:endParaRPr lang="en-US" sz="1000" b="1" dirty="0"/>
             </a:p>
           </p:txBody>
         </p:sp>
@@ -5733,7 +5644,6 @@
                 <a:rPr lang="en-US" sz="1000" b="1" dirty="0"/>
                 <a:t>MM</a:t>
               </a:r>
-              <a:endParaRPr lang="en-US" sz="1000" b="1" dirty="0"/>
             </a:p>
           </p:txBody>
         </p:sp>
@@ -5821,7 +5731,6 @@
                 <a:rPr lang="en-US" sz="1000" b="1" dirty="0"/>
                 <a:t>MM</a:t>
               </a:r>
-              <a:endParaRPr lang="en-US" sz="1000" b="1" dirty="0"/>
             </a:p>
           </p:txBody>
         </p:sp>
@@ -5909,7 +5818,6 @@
                 <a:rPr lang="en-US" sz="1000" b="1" dirty="0"/>
                 <a:t>MM</a:t>
               </a:r>
-              <a:endParaRPr lang="en-US" sz="1000" b="1" dirty="0"/>
             </a:p>
           </p:txBody>
         </p:sp>
@@ -5947,7 +5855,6 @@
                 <a:rPr lang="en-US" sz="1000" b="1" dirty="0"/>
                 <a:t>MM</a:t>
               </a:r>
-              <a:endParaRPr lang="en-US" sz="1000" b="1" dirty="0"/>
             </a:p>
           </p:txBody>
         </p:sp>
@@ -5985,7 +5892,6 @@
                 <a:rPr lang="en-US" sz="1000" b="1" dirty="0"/>
                 <a:t>Mm</a:t>
               </a:r>
-              <a:endParaRPr lang="en-US" sz="1000" b="1" dirty="0"/>
             </a:p>
           </p:txBody>
         </p:sp>
@@ -6023,7 +5929,6 @@
                 <a:rPr lang="en-US" sz="1000" b="1" dirty="0"/>
                 <a:t>Mm</a:t>
               </a:r>
-              <a:endParaRPr lang="en-US" sz="1000" b="1" dirty="0"/>
             </a:p>
           </p:txBody>
         </p:sp>
@@ -6061,7 +5966,6 @@
                 <a:rPr lang="en-US" sz="1000" b="1" dirty="0"/>
                 <a:t>Mm</a:t>
               </a:r>
-              <a:endParaRPr lang="en-US" sz="1000" b="1" dirty="0"/>
             </a:p>
           </p:txBody>
         </p:sp>
@@ -6149,7 +6053,6 @@
                 <a:rPr lang="en-US" sz="1000" b="1" dirty="0"/>
                 <a:t>Mm</a:t>
               </a:r>
-              <a:endParaRPr lang="en-US" sz="1000" b="1" dirty="0"/>
             </a:p>
           </p:txBody>
         </p:sp>
@@ -6309,7 +6212,6 @@
                 <a:rPr lang="en-US" sz="1000" b="1" dirty="0"/>
                 <a:t>MM</a:t>
               </a:r>
-              <a:endParaRPr lang="en-US" sz="1000" b="1" dirty="0"/>
             </a:p>
           </p:txBody>
         </p:sp>
@@ -6397,7 +6299,6 @@
                 <a:rPr lang="en-US" sz="1000" b="1" dirty="0"/>
                 <a:t>Mm</a:t>
               </a:r>
-              <a:endParaRPr lang="en-US" sz="1000" b="1" dirty="0"/>
             </a:p>
           </p:txBody>
         </p:sp>
@@ -6485,7 +6386,6 @@
                 <a:rPr lang="en-US" sz="1000" b="1" dirty="0"/>
                 <a:t>MM</a:t>
               </a:r>
-              <a:endParaRPr lang="en-US" sz="1000" b="1" dirty="0"/>
             </a:p>
           </p:txBody>
         </p:sp>
@@ -6573,7 +6473,6 @@
                 <a:rPr lang="en-US" sz="1000" b="1" dirty="0"/>
                 <a:t>MM</a:t>
               </a:r>
-              <a:endParaRPr lang="en-US" sz="1000" b="1" dirty="0"/>
             </a:p>
           </p:txBody>
         </p:sp>
@@ -6697,7 +6596,6 @@
                 <a:rPr lang="en-US" sz="1000" b="1" dirty="0"/>
                 <a:t>MM</a:t>
               </a:r>
-              <a:endParaRPr lang="en-US" sz="1000" b="1" dirty="0"/>
             </a:p>
           </p:txBody>
         </p:sp>
@@ -6785,7 +6683,6 @@
                 <a:rPr lang="en-US" sz="1000" b="1" dirty="0"/>
                 <a:t>MM</a:t>
               </a:r>
-              <a:endParaRPr lang="en-US" sz="1000" b="1" dirty="0"/>
             </a:p>
           </p:txBody>
         </p:sp>
@@ -6909,7 +6806,6 @@
                 <a:rPr lang="en-US" sz="1000" b="1" dirty="0"/>
                 <a:t>Mm</a:t>
               </a:r>
-              <a:endParaRPr lang="en-US" sz="1000" b="1" dirty="0"/>
             </a:p>
           </p:txBody>
         </p:sp>
@@ -6997,7 +6893,6 @@
                 <a:rPr lang="en-US" sz="1000" b="1" dirty="0"/>
                 <a:t>MM</a:t>
               </a:r>
-              <a:endParaRPr lang="en-US" sz="1000" b="1" dirty="0"/>
             </a:p>
           </p:txBody>
         </p:sp>
@@ -7027,7 +6922,6 @@
                 <a:rPr lang="en-US" sz="700" b="1" dirty="0"/>
                 <a:t>m allele is a neo-W</a:t>
               </a:r>
-              <a:endParaRPr lang="en-US" sz="700" b="1" dirty="0"/>
             </a:p>
           </p:txBody>
         </p:sp>
@@ -7057,7 +6951,6 @@
                 <a:rPr lang="en-US" sz="700" b="1" dirty="0"/>
                 <a:t>m allele is a neo-Y</a:t>
               </a:r>
-              <a:endParaRPr lang="en-US" sz="700" b="1" dirty="0"/>
             </a:p>
           </p:txBody>
         </p:sp>
@@ -7119,7 +7012,6 @@
               <a:rPr lang="en-US" sz="1000" b="1" dirty="0"/>
               <a:t>b</a:t>
             </a:r>
-            <a:endParaRPr lang="en-US" sz="1000" b="1" dirty="0"/>
           </a:p>
         </p:txBody>
       </p:sp>
@@ -7150,7 +7042,6 @@
               <a:rPr lang="en-US" sz="1000" b="1" dirty="0"/>
               <a:t>c</a:t>
             </a:r>
-            <a:endParaRPr lang="en-US" sz="1000" b="1" dirty="0"/>
           </a:p>
         </p:txBody>
       </p:sp>
@@ -7253,7 +7144,6 @@
               <a:rPr lang="en-US" sz="1000" b="1" dirty="0"/>
               <a:t>d</a:t>
             </a:r>
-            <a:endParaRPr lang="en-US" sz="1000" b="1" dirty="0"/>
           </a:p>
         </p:txBody>
       </p:sp>

</xml_diff>

<commit_message>
everything uploaded to plos site, all figures passed pace system
</commit_message>
<xml_diff>
--- a/Plots/Sex_determination_outline.pptx
+++ b/Plots/Sex_determination_outline.pptx
@@ -243,7 +243,7 @@
           <a:p>
             <a:fld id="{C437F6A3-4B0E-974E-8C94-07C070FFF74A}" type="datetimeFigureOut">
               <a:rPr lang="en-US" smtClean="0"/>
-              <a:t>12/1/17</a:t>
+              <a:t>2/6/18</a:t>
             </a:fld>
             <a:endParaRPr lang="en-US"/>
           </a:p>
@@ -408,7 +408,7 @@
           <a:p>
             <a:fld id="{C437F6A3-4B0E-974E-8C94-07C070FFF74A}" type="datetimeFigureOut">
               <a:rPr lang="en-US" smtClean="0"/>
-              <a:t>12/1/17</a:t>
+              <a:t>2/6/18</a:t>
             </a:fld>
             <a:endParaRPr lang="en-US"/>
           </a:p>
@@ -583,7 +583,7 @@
           <a:p>
             <a:fld id="{C437F6A3-4B0E-974E-8C94-07C070FFF74A}" type="datetimeFigureOut">
               <a:rPr lang="en-US" smtClean="0"/>
-              <a:t>12/1/17</a:t>
+              <a:t>2/6/18</a:t>
             </a:fld>
             <a:endParaRPr lang="en-US"/>
           </a:p>
@@ -748,7 +748,7 @@
           <a:p>
             <a:fld id="{C437F6A3-4B0E-974E-8C94-07C070FFF74A}" type="datetimeFigureOut">
               <a:rPr lang="en-US" smtClean="0"/>
-              <a:t>12/1/17</a:t>
+              <a:t>2/6/18</a:t>
             </a:fld>
             <a:endParaRPr lang="en-US"/>
           </a:p>
@@ -987,7 +987,7 @@
           <a:p>
             <a:fld id="{C437F6A3-4B0E-974E-8C94-07C070FFF74A}" type="datetimeFigureOut">
               <a:rPr lang="en-US" smtClean="0"/>
-              <a:t>12/1/17</a:t>
+              <a:t>2/6/18</a:t>
             </a:fld>
             <a:endParaRPr lang="en-US"/>
           </a:p>
@@ -1214,7 +1214,7 @@
           <a:p>
             <a:fld id="{C437F6A3-4B0E-974E-8C94-07C070FFF74A}" type="datetimeFigureOut">
               <a:rPr lang="en-US" smtClean="0"/>
-              <a:t>12/1/17</a:t>
+              <a:t>2/6/18</a:t>
             </a:fld>
             <a:endParaRPr lang="en-US"/>
           </a:p>
@@ -1576,7 +1576,7 @@
           <a:p>
             <a:fld id="{C437F6A3-4B0E-974E-8C94-07C070FFF74A}" type="datetimeFigureOut">
               <a:rPr lang="en-US" smtClean="0"/>
-              <a:t>12/1/17</a:t>
+              <a:t>2/6/18</a:t>
             </a:fld>
             <a:endParaRPr lang="en-US"/>
           </a:p>
@@ -1689,7 +1689,7 @@
           <a:p>
             <a:fld id="{C437F6A3-4B0E-974E-8C94-07C070FFF74A}" type="datetimeFigureOut">
               <a:rPr lang="en-US" smtClean="0"/>
-              <a:t>12/1/17</a:t>
+              <a:t>2/6/18</a:t>
             </a:fld>
             <a:endParaRPr lang="en-US"/>
           </a:p>
@@ -1779,7 +1779,7 @@
           <a:p>
             <a:fld id="{C437F6A3-4B0E-974E-8C94-07C070FFF74A}" type="datetimeFigureOut">
               <a:rPr lang="en-US" smtClean="0"/>
-              <a:t>12/1/17</a:t>
+              <a:t>2/6/18</a:t>
             </a:fld>
             <a:endParaRPr lang="en-US"/>
           </a:p>
@@ -2051,7 +2051,7 @@
           <a:p>
             <a:fld id="{C437F6A3-4B0E-974E-8C94-07C070FFF74A}" type="datetimeFigureOut">
               <a:rPr lang="en-US" smtClean="0"/>
-              <a:t>12/1/17</a:t>
+              <a:t>2/6/18</a:t>
             </a:fld>
             <a:endParaRPr lang="en-US"/>
           </a:p>
@@ -2303,7 +2303,7 @@
           <a:p>
             <a:fld id="{C437F6A3-4B0E-974E-8C94-07C070FFF74A}" type="datetimeFigureOut">
               <a:rPr lang="en-US" smtClean="0"/>
-              <a:t>12/1/17</a:t>
+              <a:t>2/6/18</a:t>
             </a:fld>
             <a:endParaRPr lang="en-US"/>
           </a:p>
@@ -2511,7 +2511,7 @@
           <a:p>
             <a:fld id="{C437F6A3-4B0E-974E-8C94-07C070FFF74A}" type="datetimeFigureOut">
               <a:rPr lang="en-US" smtClean="0"/>
-              <a:t>12/1/17</a:t>
+              <a:t>2/6/18</a:t>
             </a:fld>
             <a:endParaRPr lang="en-US"/>
           </a:p>
@@ -5128,10 +5128,10 @@
             <a:p>
               <a:pPr algn="ctr"/>
               <a:r>
-                <a:rPr lang="el-GR" sz="1000" b="1" i="1" dirty="0"/>
+                <a:rPr lang="el-GR" sz="1000" i="1" dirty="0"/>
                 <a:t>ρ</a:t>
               </a:r>
-              <a:endParaRPr lang="en-US" sz="1000" b="1" i="1" dirty="0"/>
+              <a:endParaRPr lang="en-US" sz="1000" i="1" dirty="0"/>
             </a:p>
           </p:txBody>
         </p:sp>

</xml_diff>

<commit_message>
Sally's main text edits incorporated, not Figure changes after Figure 1
</commit_message>
<xml_diff>
--- a/Plots/Sex_determination_outline.pptx
+++ b/Plots/Sex_determination_outline.pptx
@@ -154,7 +154,7 @@
           </a:lstStyle>
           <a:p>
             <a:r>
-              <a:rPr lang="en-US" smtClean="0"/>
+              <a:rPr lang="en-US"/>
               <a:t>Click to edit Master title style</a:t>
             </a:r>
             <a:endParaRPr lang="en-US" dirty="0"/>
@@ -219,7 +219,7 @@
           </a:lstStyle>
           <a:p>
             <a:r>
-              <a:rPr lang="en-US" smtClean="0"/>
+              <a:rPr lang="en-US"/>
               <a:t>Click to edit Master subtitle style</a:t>
             </a:r>
             <a:endParaRPr lang="en-US" dirty="0"/>
@@ -243,7 +243,7 @@
           <a:p>
             <a:fld id="{C437F6A3-4B0E-974E-8C94-07C070FFF74A}" type="datetimeFigureOut">
               <a:rPr lang="en-US" smtClean="0"/>
-              <a:t>2/6/18</a:t>
+              <a:t>5/17/18</a:t>
             </a:fld>
             <a:endParaRPr lang="en-US"/>
           </a:p>
@@ -332,7 +332,7 @@
           <a:lstStyle/>
           <a:p>
             <a:r>
-              <a:rPr lang="en-US" smtClean="0"/>
+              <a:rPr lang="en-US"/>
               <a:t>Click to edit Master title style</a:t>
             </a:r>
             <a:endParaRPr lang="en-US" dirty="0"/>
@@ -356,35 +356,35 @@
           <a:p>
             <a:pPr lvl="0"/>
             <a:r>
-              <a:rPr lang="en-US" smtClean="0"/>
+              <a:rPr lang="en-US"/>
               <a:t>Click to edit Master text styles</a:t>
             </a:r>
           </a:p>
           <a:p>
             <a:pPr lvl="1"/>
             <a:r>
-              <a:rPr lang="en-US" smtClean="0"/>
+              <a:rPr lang="en-US"/>
               <a:t>Second level</a:t>
             </a:r>
           </a:p>
           <a:p>
             <a:pPr lvl="2"/>
             <a:r>
-              <a:rPr lang="en-US" smtClean="0"/>
+              <a:rPr lang="en-US"/>
               <a:t>Third level</a:t>
             </a:r>
           </a:p>
           <a:p>
             <a:pPr lvl="3"/>
             <a:r>
-              <a:rPr lang="en-US" smtClean="0"/>
+              <a:rPr lang="en-US"/>
               <a:t>Fourth level</a:t>
             </a:r>
           </a:p>
           <a:p>
             <a:pPr lvl="4"/>
             <a:r>
-              <a:rPr lang="en-US" smtClean="0"/>
+              <a:rPr lang="en-US"/>
               <a:t>Fifth level</a:t>
             </a:r>
             <a:endParaRPr lang="en-US" dirty="0"/>
@@ -408,7 +408,7 @@
           <a:p>
             <a:fld id="{C437F6A3-4B0E-974E-8C94-07C070FFF74A}" type="datetimeFigureOut">
               <a:rPr lang="en-US" smtClean="0"/>
-              <a:t>2/6/18</a:t>
+              <a:t>5/17/18</a:t>
             </a:fld>
             <a:endParaRPr lang="en-US"/>
           </a:p>
@@ -502,7 +502,7 @@
           <a:lstStyle/>
           <a:p>
             <a:r>
-              <a:rPr lang="en-US" smtClean="0"/>
+              <a:rPr lang="en-US"/>
               <a:t>Click to edit Master title style</a:t>
             </a:r>
             <a:endParaRPr lang="en-US" dirty="0"/>
@@ -531,35 +531,35 @@
           <a:p>
             <a:pPr lvl="0"/>
             <a:r>
-              <a:rPr lang="en-US" smtClean="0"/>
+              <a:rPr lang="en-US"/>
               <a:t>Click to edit Master text styles</a:t>
             </a:r>
           </a:p>
           <a:p>
             <a:pPr lvl="1"/>
             <a:r>
-              <a:rPr lang="en-US" smtClean="0"/>
+              <a:rPr lang="en-US"/>
               <a:t>Second level</a:t>
             </a:r>
           </a:p>
           <a:p>
             <a:pPr lvl="2"/>
             <a:r>
-              <a:rPr lang="en-US" smtClean="0"/>
+              <a:rPr lang="en-US"/>
               <a:t>Third level</a:t>
             </a:r>
           </a:p>
           <a:p>
             <a:pPr lvl="3"/>
             <a:r>
-              <a:rPr lang="en-US" smtClean="0"/>
+              <a:rPr lang="en-US"/>
               <a:t>Fourth level</a:t>
             </a:r>
           </a:p>
           <a:p>
             <a:pPr lvl="4"/>
             <a:r>
-              <a:rPr lang="en-US" smtClean="0"/>
+              <a:rPr lang="en-US"/>
               <a:t>Fifth level</a:t>
             </a:r>
             <a:endParaRPr lang="en-US" dirty="0"/>
@@ -583,7 +583,7 @@
           <a:p>
             <a:fld id="{C437F6A3-4B0E-974E-8C94-07C070FFF74A}" type="datetimeFigureOut">
               <a:rPr lang="en-US" smtClean="0"/>
-              <a:t>2/6/18</a:t>
+              <a:t>5/17/18</a:t>
             </a:fld>
             <a:endParaRPr lang="en-US"/>
           </a:p>
@@ -672,7 +672,7 @@
           <a:lstStyle/>
           <a:p>
             <a:r>
-              <a:rPr lang="en-US" smtClean="0"/>
+              <a:rPr lang="en-US"/>
               <a:t>Click to edit Master title style</a:t>
             </a:r>
             <a:endParaRPr lang="en-US" dirty="0"/>
@@ -696,35 +696,35 @@
           <a:p>
             <a:pPr lvl="0"/>
             <a:r>
-              <a:rPr lang="en-US" smtClean="0"/>
+              <a:rPr lang="en-US"/>
               <a:t>Click to edit Master text styles</a:t>
             </a:r>
           </a:p>
           <a:p>
             <a:pPr lvl="1"/>
             <a:r>
-              <a:rPr lang="en-US" smtClean="0"/>
+              <a:rPr lang="en-US"/>
               <a:t>Second level</a:t>
             </a:r>
           </a:p>
           <a:p>
             <a:pPr lvl="2"/>
             <a:r>
-              <a:rPr lang="en-US" smtClean="0"/>
+              <a:rPr lang="en-US"/>
               <a:t>Third level</a:t>
             </a:r>
           </a:p>
           <a:p>
             <a:pPr lvl="3"/>
             <a:r>
-              <a:rPr lang="en-US" smtClean="0"/>
+              <a:rPr lang="en-US"/>
               <a:t>Fourth level</a:t>
             </a:r>
           </a:p>
           <a:p>
             <a:pPr lvl="4"/>
             <a:r>
-              <a:rPr lang="en-US" smtClean="0"/>
+              <a:rPr lang="en-US"/>
               <a:t>Fifth level</a:t>
             </a:r>
             <a:endParaRPr lang="en-US" dirty="0"/>
@@ -748,7 +748,7 @@
           <a:p>
             <a:fld id="{C437F6A3-4B0E-974E-8C94-07C070FFF74A}" type="datetimeFigureOut">
               <a:rPr lang="en-US" smtClean="0"/>
-              <a:t>2/6/18</a:t>
+              <a:t>5/17/18</a:t>
             </a:fld>
             <a:endParaRPr lang="en-US"/>
           </a:p>
@@ -846,7 +846,7 @@
           </a:lstStyle>
           <a:p>
             <a:r>
-              <a:rPr lang="en-US" smtClean="0"/>
+              <a:rPr lang="en-US"/>
               <a:t>Click to edit Master title style</a:t>
             </a:r>
             <a:endParaRPr lang="en-US" dirty="0"/>
@@ -964,7 +964,7 @@
           <a:p>
             <a:pPr lvl="0"/>
             <a:r>
-              <a:rPr lang="en-US" smtClean="0"/>
+              <a:rPr lang="en-US"/>
               <a:t>Click to edit Master text styles</a:t>
             </a:r>
           </a:p>
@@ -987,7 +987,7 @@
           <a:p>
             <a:fld id="{C437F6A3-4B0E-974E-8C94-07C070FFF74A}" type="datetimeFigureOut">
               <a:rPr lang="en-US" smtClean="0"/>
-              <a:t>2/6/18</a:t>
+              <a:t>5/17/18</a:t>
             </a:fld>
             <a:endParaRPr lang="en-US"/>
           </a:p>
@@ -1076,7 +1076,7 @@
           <a:lstStyle/>
           <a:p>
             <a:r>
-              <a:rPr lang="en-US" smtClean="0"/>
+              <a:rPr lang="en-US"/>
               <a:t>Click to edit Master title style</a:t>
             </a:r>
             <a:endParaRPr lang="en-US" dirty="0"/>
@@ -1105,35 +1105,35 @@
           <a:p>
             <a:pPr lvl="0"/>
             <a:r>
-              <a:rPr lang="en-US" smtClean="0"/>
+              <a:rPr lang="en-US"/>
               <a:t>Click to edit Master text styles</a:t>
             </a:r>
           </a:p>
           <a:p>
             <a:pPr lvl="1"/>
             <a:r>
-              <a:rPr lang="en-US" smtClean="0"/>
+              <a:rPr lang="en-US"/>
               <a:t>Second level</a:t>
             </a:r>
           </a:p>
           <a:p>
             <a:pPr lvl="2"/>
             <a:r>
-              <a:rPr lang="en-US" smtClean="0"/>
+              <a:rPr lang="en-US"/>
               <a:t>Third level</a:t>
             </a:r>
           </a:p>
           <a:p>
             <a:pPr lvl="3"/>
             <a:r>
-              <a:rPr lang="en-US" smtClean="0"/>
+              <a:rPr lang="en-US"/>
               <a:t>Fourth level</a:t>
             </a:r>
           </a:p>
           <a:p>
             <a:pPr lvl="4"/>
             <a:r>
-              <a:rPr lang="en-US" smtClean="0"/>
+              <a:rPr lang="en-US"/>
               <a:t>Fifth level</a:t>
             </a:r>
             <a:endParaRPr lang="en-US" dirty="0"/>
@@ -1162,35 +1162,35 @@
           <a:p>
             <a:pPr lvl="0"/>
             <a:r>
-              <a:rPr lang="en-US" smtClean="0"/>
+              <a:rPr lang="en-US"/>
               <a:t>Click to edit Master text styles</a:t>
             </a:r>
           </a:p>
           <a:p>
             <a:pPr lvl="1"/>
             <a:r>
-              <a:rPr lang="en-US" smtClean="0"/>
+              <a:rPr lang="en-US"/>
               <a:t>Second level</a:t>
             </a:r>
           </a:p>
           <a:p>
             <a:pPr lvl="2"/>
             <a:r>
-              <a:rPr lang="en-US" smtClean="0"/>
+              <a:rPr lang="en-US"/>
               <a:t>Third level</a:t>
             </a:r>
           </a:p>
           <a:p>
             <a:pPr lvl="3"/>
             <a:r>
-              <a:rPr lang="en-US" smtClean="0"/>
+              <a:rPr lang="en-US"/>
               <a:t>Fourth level</a:t>
             </a:r>
           </a:p>
           <a:p>
             <a:pPr lvl="4"/>
             <a:r>
-              <a:rPr lang="en-US" smtClean="0"/>
+              <a:rPr lang="en-US"/>
               <a:t>Fifth level</a:t>
             </a:r>
             <a:endParaRPr lang="en-US" dirty="0"/>
@@ -1214,7 +1214,7 @@
           <a:p>
             <a:fld id="{C437F6A3-4B0E-974E-8C94-07C070FFF74A}" type="datetimeFigureOut">
               <a:rPr lang="en-US" smtClean="0"/>
-              <a:t>2/6/18</a:t>
+              <a:t>5/17/18</a:t>
             </a:fld>
             <a:endParaRPr lang="en-US"/>
           </a:p>
@@ -1308,7 +1308,7 @@
           <a:lstStyle/>
           <a:p>
             <a:r>
-              <a:rPr lang="en-US" smtClean="0"/>
+              <a:rPr lang="en-US"/>
               <a:t>Click to edit Master title style</a:t>
             </a:r>
             <a:endParaRPr lang="en-US" dirty="0"/>
@@ -1374,7 +1374,7 @@
           <a:p>
             <a:pPr lvl="0"/>
             <a:r>
-              <a:rPr lang="en-US" smtClean="0"/>
+              <a:rPr lang="en-US"/>
               <a:t>Click to edit Master text styles</a:t>
             </a:r>
           </a:p>
@@ -1402,35 +1402,35 @@
           <a:p>
             <a:pPr lvl="0"/>
             <a:r>
-              <a:rPr lang="en-US" smtClean="0"/>
+              <a:rPr lang="en-US"/>
               <a:t>Click to edit Master text styles</a:t>
             </a:r>
           </a:p>
           <a:p>
             <a:pPr lvl="1"/>
             <a:r>
-              <a:rPr lang="en-US" smtClean="0"/>
+              <a:rPr lang="en-US"/>
               <a:t>Second level</a:t>
             </a:r>
           </a:p>
           <a:p>
             <a:pPr lvl="2"/>
             <a:r>
-              <a:rPr lang="en-US" smtClean="0"/>
+              <a:rPr lang="en-US"/>
               <a:t>Third level</a:t>
             </a:r>
           </a:p>
           <a:p>
             <a:pPr lvl="3"/>
             <a:r>
-              <a:rPr lang="en-US" smtClean="0"/>
+              <a:rPr lang="en-US"/>
               <a:t>Fourth level</a:t>
             </a:r>
           </a:p>
           <a:p>
             <a:pPr lvl="4"/>
             <a:r>
-              <a:rPr lang="en-US" smtClean="0"/>
+              <a:rPr lang="en-US"/>
               <a:t>Fifth level</a:t>
             </a:r>
             <a:endParaRPr lang="en-US" dirty="0"/>
@@ -1496,7 +1496,7 @@
           <a:p>
             <a:pPr lvl="0"/>
             <a:r>
-              <a:rPr lang="en-US" smtClean="0"/>
+              <a:rPr lang="en-US"/>
               <a:t>Click to edit Master text styles</a:t>
             </a:r>
           </a:p>
@@ -1524,35 +1524,35 @@
           <a:p>
             <a:pPr lvl="0"/>
             <a:r>
-              <a:rPr lang="en-US" smtClean="0"/>
+              <a:rPr lang="en-US"/>
               <a:t>Click to edit Master text styles</a:t>
             </a:r>
           </a:p>
           <a:p>
             <a:pPr lvl="1"/>
             <a:r>
-              <a:rPr lang="en-US" smtClean="0"/>
+              <a:rPr lang="en-US"/>
               <a:t>Second level</a:t>
             </a:r>
           </a:p>
           <a:p>
             <a:pPr lvl="2"/>
             <a:r>
-              <a:rPr lang="en-US" smtClean="0"/>
+              <a:rPr lang="en-US"/>
               <a:t>Third level</a:t>
             </a:r>
           </a:p>
           <a:p>
             <a:pPr lvl="3"/>
             <a:r>
-              <a:rPr lang="en-US" smtClean="0"/>
+              <a:rPr lang="en-US"/>
               <a:t>Fourth level</a:t>
             </a:r>
           </a:p>
           <a:p>
             <a:pPr lvl="4"/>
             <a:r>
-              <a:rPr lang="en-US" smtClean="0"/>
+              <a:rPr lang="en-US"/>
               <a:t>Fifth level</a:t>
             </a:r>
             <a:endParaRPr lang="en-US" dirty="0"/>
@@ -1576,7 +1576,7 @@
           <a:p>
             <a:fld id="{C437F6A3-4B0E-974E-8C94-07C070FFF74A}" type="datetimeFigureOut">
               <a:rPr lang="en-US" smtClean="0"/>
-              <a:t>2/6/18</a:t>
+              <a:t>5/17/18</a:t>
             </a:fld>
             <a:endParaRPr lang="en-US"/>
           </a:p>
@@ -1665,7 +1665,7 @@
           <a:lstStyle/>
           <a:p>
             <a:r>
-              <a:rPr lang="en-US" smtClean="0"/>
+              <a:rPr lang="en-US"/>
               <a:t>Click to edit Master title style</a:t>
             </a:r>
             <a:endParaRPr lang="en-US" dirty="0"/>
@@ -1689,7 +1689,7 @@
           <a:p>
             <a:fld id="{C437F6A3-4B0E-974E-8C94-07C070FFF74A}" type="datetimeFigureOut">
               <a:rPr lang="en-US" smtClean="0"/>
-              <a:t>2/6/18</a:t>
+              <a:t>5/17/18</a:t>
             </a:fld>
             <a:endParaRPr lang="en-US"/>
           </a:p>
@@ -1779,7 +1779,7 @@
           <a:p>
             <a:fld id="{C437F6A3-4B0E-974E-8C94-07C070FFF74A}" type="datetimeFigureOut">
               <a:rPr lang="en-US" smtClean="0"/>
-              <a:t>2/6/18</a:t>
+              <a:t>5/17/18</a:t>
             </a:fld>
             <a:endParaRPr lang="en-US"/>
           </a:p>
@@ -1877,7 +1877,7 @@
           </a:lstStyle>
           <a:p>
             <a:r>
-              <a:rPr lang="en-US" smtClean="0"/>
+              <a:rPr lang="en-US"/>
               <a:t>Click to edit Master title style</a:t>
             </a:r>
             <a:endParaRPr lang="en-US" dirty="0"/>
@@ -1934,35 +1934,35 @@
           <a:p>
             <a:pPr lvl="0"/>
             <a:r>
-              <a:rPr lang="en-US" smtClean="0"/>
+              <a:rPr lang="en-US"/>
               <a:t>Click to edit Master text styles</a:t>
             </a:r>
           </a:p>
           <a:p>
             <a:pPr lvl="1"/>
             <a:r>
-              <a:rPr lang="en-US" smtClean="0"/>
+              <a:rPr lang="en-US"/>
               <a:t>Second level</a:t>
             </a:r>
           </a:p>
           <a:p>
             <a:pPr lvl="2"/>
             <a:r>
-              <a:rPr lang="en-US" smtClean="0"/>
+              <a:rPr lang="en-US"/>
               <a:t>Third level</a:t>
             </a:r>
           </a:p>
           <a:p>
             <a:pPr lvl="3"/>
             <a:r>
-              <a:rPr lang="en-US" smtClean="0"/>
+              <a:rPr lang="en-US"/>
               <a:t>Fourth level</a:t>
             </a:r>
           </a:p>
           <a:p>
             <a:pPr lvl="4"/>
             <a:r>
-              <a:rPr lang="en-US" smtClean="0"/>
+              <a:rPr lang="en-US"/>
               <a:t>Fifth level</a:t>
             </a:r>
             <a:endParaRPr lang="en-US" dirty="0"/>
@@ -2028,7 +2028,7 @@
           <a:p>
             <a:pPr lvl="0"/>
             <a:r>
-              <a:rPr lang="en-US" smtClean="0"/>
+              <a:rPr lang="en-US"/>
               <a:t>Click to edit Master text styles</a:t>
             </a:r>
           </a:p>
@@ -2051,7 +2051,7 @@
           <a:p>
             <a:fld id="{C437F6A3-4B0E-974E-8C94-07C070FFF74A}" type="datetimeFigureOut">
               <a:rPr lang="en-US" smtClean="0"/>
-              <a:t>2/6/18</a:t>
+              <a:t>5/17/18</a:t>
             </a:fld>
             <a:endParaRPr lang="en-US"/>
           </a:p>
@@ -2149,7 +2149,7 @@
           </a:lstStyle>
           <a:p>
             <a:r>
-              <a:rPr lang="en-US" smtClean="0"/>
+              <a:rPr lang="en-US"/>
               <a:t>Click to edit Master title style</a:t>
             </a:r>
             <a:endParaRPr lang="en-US" dirty="0"/>
@@ -2214,7 +2214,7 @@
           </a:lstStyle>
           <a:p>
             <a:r>
-              <a:rPr lang="en-US" smtClean="0"/>
+              <a:rPr lang="en-US"/>
               <a:t>Drag picture to placeholder or click icon to add</a:t>
             </a:r>
             <a:endParaRPr lang="en-US" dirty="0"/>
@@ -2280,7 +2280,7 @@
           <a:p>
             <a:pPr lvl="0"/>
             <a:r>
-              <a:rPr lang="en-US" smtClean="0"/>
+              <a:rPr lang="en-US"/>
               <a:t>Click to edit Master text styles</a:t>
             </a:r>
           </a:p>
@@ -2303,7 +2303,7 @@
           <a:p>
             <a:fld id="{C437F6A3-4B0E-974E-8C94-07C070FFF74A}" type="datetimeFigureOut">
               <a:rPr lang="en-US" smtClean="0"/>
-              <a:t>2/6/18</a:t>
+              <a:t>5/17/18</a:t>
             </a:fld>
             <a:endParaRPr lang="en-US"/>
           </a:p>
@@ -2407,7 +2407,7 @@
           <a:lstStyle/>
           <a:p>
             <a:r>
-              <a:rPr lang="en-US" smtClean="0"/>
+              <a:rPr lang="en-US"/>
               <a:t>Click to edit Master title style</a:t>
             </a:r>
             <a:endParaRPr lang="en-US" dirty="0"/>
@@ -2441,35 +2441,35 @@
           <a:p>
             <a:pPr lvl="0"/>
             <a:r>
-              <a:rPr lang="en-US" smtClean="0"/>
+              <a:rPr lang="en-US"/>
               <a:t>Click to edit Master text styles</a:t>
             </a:r>
           </a:p>
           <a:p>
             <a:pPr lvl="1"/>
             <a:r>
-              <a:rPr lang="en-US" smtClean="0"/>
+              <a:rPr lang="en-US"/>
               <a:t>Second level</a:t>
             </a:r>
           </a:p>
           <a:p>
             <a:pPr lvl="2"/>
             <a:r>
-              <a:rPr lang="en-US" smtClean="0"/>
+              <a:rPr lang="en-US"/>
               <a:t>Third level</a:t>
             </a:r>
           </a:p>
           <a:p>
             <a:pPr lvl="3"/>
             <a:r>
-              <a:rPr lang="en-US" smtClean="0"/>
+              <a:rPr lang="en-US"/>
               <a:t>Fourth level</a:t>
             </a:r>
           </a:p>
           <a:p>
             <a:pPr lvl="4"/>
             <a:r>
-              <a:rPr lang="en-US" smtClean="0"/>
+              <a:rPr lang="en-US"/>
               <a:t>Fifth level</a:t>
             </a:r>
             <a:endParaRPr lang="en-US" dirty="0"/>
@@ -2511,7 +2511,7 @@
           <a:p>
             <a:fld id="{C437F6A3-4B0E-974E-8C94-07C070FFF74A}" type="datetimeFigureOut">
               <a:rPr lang="en-US" smtClean="0"/>
-              <a:t>2/6/18</a:t>
+              <a:t>5/17/18</a:t>
             </a:fld>
             <a:endParaRPr lang="en-US"/>
           </a:p>
@@ -2924,22 +2924,72 @@
         </p:nvGrpSpPr>
         <p:grpSpPr>
           <a:xfrm>
-            <a:off x="2052779" y="31955"/>
-            <a:ext cx="2566448" cy="1260000"/>
+            <a:off x="1983203" y="64994"/>
+            <a:ext cx="2781287" cy="1260000"/>
             <a:chOff x="2722321" y="136068"/>
-            <a:chExt cx="2566448" cy="1260000"/>
+            <a:chExt cx="2781287" cy="1260000"/>
           </a:xfrm>
         </p:grpSpPr>
         <p:sp>
           <p:nvSpPr>
-            <p:cNvPr id="320" name="Rounded Rectangle 319"/>
+            <p:cNvPr id="368" name="Rounded Rectangle 367"/>
             <p:cNvSpPr/>
             <p:nvPr/>
           </p:nvSpPr>
           <p:spPr>
             <a:xfrm>
-              <a:off x="3748321" y="185106"/>
-              <a:ext cx="396153" cy="745099"/>
+              <a:off x="4199263" y="1059497"/>
+              <a:ext cx="396153" cy="254813"/>
+            </a:xfrm>
+            <a:prstGeom prst="roundRect">
+              <a:avLst>
+                <a:gd name="adj" fmla="val 23718"/>
+              </a:avLst>
+            </a:prstGeom>
+            <a:solidFill>
+              <a:srgbClr val="00B050">
+                <a:alpha val="30000"/>
+              </a:srgbClr>
+            </a:solidFill>
+            <a:ln>
+              <a:noFill/>
+            </a:ln>
+          </p:spPr>
+          <p:style>
+            <a:lnRef idx="2">
+              <a:schemeClr val="accent1">
+                <a:shade val="50000"/>
+              </a:schemeClr>
+            </a:lnRef>
+            <a:fillRef idx="1">
+              <a:schemeClr val="accent1"/>
+            </a:fillRef>
+            <a:effectRef idx="0">
+              <a:schemeClr val="accent1"/>
+            </a:effectRef>
+            <a:fontRef idx="minor">
+              <a:schemeClr val="lt1"/>
+            </a:fontRef>
+          </p:style>
+          <p:txBody>
+            <a:bodyPr rtlCol="0" anchor="ctr"/>
+            <a:lstStyle/>
+            <a:p>
+              <a:pPr algn="ctr"/>
+              <a:endParaRPr lang="en-US" sz="389"/>
+            </a:p>
+          </p:txBody>
+        </p:sp>
+        <p:sp>
+          <p:nvSpPr>
+            <p:cNvPr id="369" name="Rounded Rectangle 368"/>
+            <p:cNvSpPr/>
+            <p:nvPr/>
+          </p:nvSpPr>
+          <p:spPr>
+            <a:xfrm>
+              <a:off x="3748321" y="1059495"/>
+              <a:ext cx="396153" cy="254815"/>
             </a:xfrm>
             <a:prstGeom prst="roundRect">
               <a:avLst>
@@ -2976,78 +3026,20 @@
             <a:lstStyle/>
             <a:p>
               <a:pPr algn="ctr"/>
-              <a:endParaRPr lang="en-US" sz="389" dirty="0"/>
+              <a:endParaRPr lang="en-US" sz="389"/>
             </a:p>
           </p:txBody>
         </p:sp>
         <p:sp>
           <p:nvSpPr>
-            <p:cNvPr id="321" name="TextBox 320"/>
-            <p:cNvSpPr txBox="1"/>
+            <p:cNvPr id="367" name="Rounded Rectangle 366"/>
+            <p:cNvSpPr/>
             <p:nvPr/>
           </p:nvSpPr>
           <p:spPr>
             <a:xfrm>
-              <a:off x="3694321" y="703455"/>
-              <a:ext cx="296876" cy="240066"/>
-            </a:xfrm>
-            <a:prstGeom prst="rect">
-              <a:avLst/>
-            </a:prstGeom>
-            <a:noFill/>
-          </p:spPr>
-          <p:txBody>
-            <a:bodyPr wrap="none" rtlCol="0">
-              <a:spAutoFit/>
-            </a:bodyPr>
-            <a:lstStyle/>
-            <a:p>
-              <a:r>
-                <a:rPr lang="en-US" sz="960" b="1" dirty="0"/>
-                <a:t>W</a:t>
-              </a:r>
-            </a:p>
-          </p:txBody>
-        </p:sp>
-        <p:sp>
-          <p:nvSpPr>
-            <p:cNvPr id="322" name="TextBox 321"/>
-            <p:cNvSpPr txBox="1"/>
-            <p:nvPr/>
-          </p:nvSpPr>
-          <p:spPr>
-            <a:xfrm>
-              <a:off x="3928321" y="700306"/>
-              <a:ext cx="243978" cy="241200"/>
-            </a:xfrm>
-            <a:prstGeom prst="rect">
-              <a:avLst/>
-            </a:prstGeom>
-            <a:noFill/>
-          </p:spPr>
-          <p:txBody>
-            <a:bodyPr wrap="none" rtlCol="0">
-              <a:spAutoFit/>
-            </a:bodyPr>
-            <a:lstStyle/>
-            <a:p>
-              <a:r>
-                <a:rPr lang="en-US" sz="960" b="1" dirty="0"/>
-                <a:t>Z</a:t>
-              </a:r>
-            </a:p>
-          </p:txBody>
-        </p:sp>
-        <p:sp>
-          <p:nvSpPr>
-            <p:cNvPr id="323" name="Rounded Rectangle 322"/>
-            <p:cNvSpPr/>
-            <p:nvPr/>
-          </p:nvSpPr>
-          <p:spPr>
-            <a:xfrm>
-              <a:off x="3172321" y="185107"/>
-              <a:ext cx="396153" cy="745098"/>
+              <a:off x="3162247" y="1059498"/>
+              <a:ext cx="396153" cy="251432"/>
             </a:xfrm>
             <a:prstGeom prst="roundRect">
               <a:avLst>
@@ -3090,14 +3082,14 @@
         </p:sp>
         <p:sp>
           <p:nvSpPr>
-            <p:cNvPr id="324" name="Rounded Rectangle 323"/>
+            <p:cNvPr id="366" name="Rounded Rectangle 365"/>
             <p:cNvSpPr/>
             <p:nvPr/>
           </p:nvSpPr>
           <p:spPr>
             <a:xfrm>
-              <a:off x="2722321" y="185107"/>
-              <a:ext cx="396153" cy="745099"/>
+              <a:off x="2726138" y="1059497"/>
+              <a:ext cx="396153" cy="254814"/>
             </a:xfrm>
             <a:prstGeom prst="roundRect">
               <a:avLst>
@@ -3140,14 +3132,64 @@
         </p:sp>
         <p:sp>
           <p:nvSpPr>
-            <p:cNvPr id="325" name="TextBox 324"/>
+            <p:cNvPr id="320" name="Rounded Rectangle 319"/>
+            <p:cNvSpPr/>
+            <p:nvPr/>
+          </p:nvSpPr>
+          <p:spPr>
+            <a:xfrm>
+              <a:off x="3748321" y="185106"/>
+              <a:ext cx="396153" cy="745099"/>
+            </a:xfrm>
+            <a:prstGeom prst="roundRect">
+              <a:avLst>
+                <a:gd name="adj" fmla="val 23718"/>
+              </a:avLst>
+            </a:prstGeom>
+            <a:solidFill>
+              <a:srgbClr val="7030A0">
+                <a:alpha val="30000"/>
+              </a:srgbClr>
+            </a:solidFill>
+            <a:ln>
+              <a:noFill/>
+            </a:ln>
+          </p:spPr>
+          <p:style>
+            <a:lnRef idx="2">
+              <a:schemeClr val="accent1">
+                <a:shade val="50000"/>
+              </a:schemeClr>
+            </a:lnRef>
+            <a:fillRef idx="1">
+              <a:schemeClr val="accent1"/>
+            </a:fillRef>
+            <a:effectRef idx="0">
+              <a:schemeClr val="accent1"/>
+            </a:effectRef>
+            <a:fontRef idx="minor">
+              <a:schemeClr val="lt1"/>
+            </a:fontRef>
+          </p:style>
+          <p:txBody>
+            <a:bodyPr rtlCol="0" anchor="ctr"/>
+            <a:lstStyle/>
+            <a:p>
+              <a:pPr algn="ctr"/>
+              <a:endParaRPr lang="en-US" sz="389" dirty="0"/>
+            </a:p>
+          </p:txBody>
+        </p:sp>
+        <p:sp>
+          <p:nvSpPr>
+            <p:cNvPr id="321" name="TextBox 320"/>
             <p:cNvSpPr txBox="1"/>
             <p:nvPr/>
           </p:nvSpPr>
           <p:spPr>
             <a:xfrm>
-              <a:off x="3215521" y="186468"/>
-              <a:ext cx="308098" cy="240066"/>
+              <a:off x="3694321" y="703455"/>
+              <a:ext cx="301686" cy="246221"/>
             </a:xfrm>
             <a:prstGeom prst="rect">
               <a:avLst/>
@@ -3161,7 +3203,165 @@
             <a:lstStyle/>
             <a:p>
               <a:r>
-                <a:rPr lang="en-US" sz="960" b="1" dirty="0"/>
+                <a:rPr lang="en-US" sz="1000" b="1" dirty="0"/>
+                <a:t>W</a:t>
+              </a:r>
+            </a:p>
+          </p:txBody>
+        </p:sp>
+        <p:sp>
+          <p:nvSpPr>
+            <p:cNvPr id="322" name="TextBox 321"/>
+            <p:cNvSpPr txBox="1"/>
+            <p:nvPr/>
+          </p:nvSpPr>
+          <p:spPr>
+            <a:xfrm>
+              <a:off x="3928321" y="700306"/>
+              <a:ext cx="245580" cy="246221"/>
+            </a:xfrm>
+            <a:prstGeom prst="rect">
+              <a:avLst/>
+            </a:prstGeom>
+            <a:noFill/>
+          </p:spPr>
+          <p:txBody>
+            <a:bodyPr wrap="none" rtlCol="0">
+              <a:spAutoFit/>
+            </a:bodyPr>
+            <a:lstStyle/>
+            <a:p>
+              <a:r>
+                <a:rPr lang="en-US" sz="1000" b="1" dirty="0"/>
+                <a:t>Z</a:t>
+              </a:r>
+            </a:p>
+          </p:txBody>
+        </p:sp>
+        <p:sp>
+          <p:nvSpPr>
+            <p:cNvPr id="323" name="Rounded Rectangle 322"/>
+            <p:cNvSpPr/>
+            <p:nvPr/>
+          </p:nvSpPr>
+          <p:spPr>
+            <a:xfrm>
+              <a:off x="3172321" y="185107"/>
+              <a:ext cx="396153" cy="745098"/>
+            </a:xfrm>
+            <a:prstGeom prst="roundRect">
+              <a:avLst>
+                <a:gd name="adj" fmla="val 23718"/>
+              </a:avLst>
+            </a:prstGeom>
+            <a:solidFill>
+              <a:srgbClr val="00B050">
+                <a:alpha val="30000"/>
+              </a:srgbClr>
+            </a:solidFill>
+            <a:ln>
+              <a:noFill/>
+            </a:ln>
+          </p:spPr>
+          <p:style>
+            <a:lnRef idx="2">
+              <a:schemeClr val="accent1">
+                <a:shade val="50000"/>
+              </a:schemeClr>
+            </a:lnRef>
+            <a:fillRef idx="1">
+              <a:schemeClr val="accent1"/>
+            </a:fillRef>
+            <a:effectRef idx="0">
+              <a:schemeClr val="accent1"/>
+            </a:effectRef>
+            <a:fontRef idx="minor">
+              <a:schemeClr val="lt1"/>
+            </a:fontRef>
+          </p:style>
+          <p:txBody>
+            <a:bodyPr rtlCol="0" anchor="ctr"/>
+            <a:lstStyle/>
+            <a:p>
+              <a:pPr algn="ctr"/>
+              <a:endParaRPr lang="en-US" sz="389"/>
+            </a:p>
+          </p:txBody>
+        </p:sp>
+        <p:sp>
+          <p:nvSpPr>
+            <p:cNvPr id="324" name="Rounded Rectangle 323"/>
+            <p:cNvSpPr/>
+            <p:nvPr/>
+          </p:nvSpPr>
+          <p:spPr>
+            <a:xfrm>
+              <a:off x="2722321" y="185107"/>
+              <a:ext cx="396153" cy="745099"/>
+            </a:xfrm>
+            <a:prstGeom prst="roundRect">
+              <a:avLst>
+                <a:gd name="adj" fmla="val 23718"/>
+              </a:avLst>
+            </a:prstGeom>
+            <a:solidFill>
+              <a:srgbClr val="7030A0">
+                <a:alpha val="30000"/>
+              </a:srgbClr>
+            </a:solidFill>
+            <a:ln>
+              <a:noFill/>
+            </a:ln>
+          </p:spPr>
+          <p:style>
+            <a:lnRef idx="2">
+              <a:schemeClr val="accent1">
+                <a:shade val="50000"/>
+              </a:schemeClr>
+            </a:lnRef>
+            <a:fillRef idx="1">
+              <a:schemeClr val="accent1"/>
+            </a:fillRef>
+            <a:effectRef idx="0">
+              <a:schemeClr val="accent1"/>
+            </a:effectRef>
+            <a:fontRef idx="minor">
+              <a:schemeClr val="lt1"/>
+            </a:fontRef>
+          </p:style>
+          <p:txBody>
+            <a:bodyPr rtlCol="0" anchor="ctr"/>
+            <a:lstStyle/>
+            <a:p>
+              <a:pPr algn="ctr"/>
+              <a:endParaRPr lang="en-US" sz="389"/>
+            </a:p>
+          </p:txBody>
+        </p:sp>
+        <p:sp>
+          <p:nvSpPr>
+            <p:cNvPr id="325" name="TextBox 324"/>
+            <p:cNvSpPr txBox="1"/>
+            <p:nvPr/>
+          </p:nvSpPr>
+          <p:spPr>
+            <a:xfrm>
+              <a:off x="3215521" y="186468"/>
+              <a:ext cx="312906" cy="246221"/>
+            </a:xfrm>
+            <a:prstGeom prst="rect">
+              <a:avLst/>
+            </a:prstGeom>
+            <a:noFill/>
+          </p:spPr>
+          <p:txBody>
+            <a:bodyPr wrap="none" rtlCol="0">
+              <a:spAutoFit/>
+            </a:bodyPr>
+            <a:lstStyle/>
+            <a:p>
+              <a:r>
+                <a:rPr lang="en-US" sz="1000" b="1" dirty="0"/>
                 <a:t>♂</a:t>
               </a:r>
             </a:p>
@@ -3176,7 +3376,7 @@
           <p:spPr>
             <a:xfrm>
               <a:off x="2765521" y="185107"/>
-              <a:ext cx="308098" cy="240066"/>
+              <a:ext cx="312906" cy="246221"/>
             </a:xfrm>
             <a:prstGeom prst="rect">
               <a:avLst/>
@@ -3190,7 +3390,7 @@
             <a:lstStyle/>
             <a:p>
               <a:r>
-                <a:rPr lang="en-US" sz="960" b="1" dirty="0"/>
+                <a:rPr lang="en-US" sz="1000" b="1" dirty="0"/>
                 <a:t>♀</a:t>
               </a:r>
             </a:p>
@@ -3205,7 +3405,7 @@
           <p:spPr>
             <a:xfrm>
               <a:off x="2761921" y="390057"/>
-              <a:ext cx="319318" cy="240066"/>
+              <a:ext cx="325730" cy="246221"/>
             </a:xfrm>
             <a:prstGeom prst="rect">
               <a:avLst/>
@@ -3219,7 +3419,7 @@
             <a:lstStyle/>
             <a:p>
               <a:r>
-                <a:rPr lang="en-US" sz="960" b="1" dirty="0"/>
+                <a:rPr lang="en-US" sz="1000" b="1" dirty="0"/>
                 <a:t>XX</a:t>
               </a:r>
             </a:p>
@@ -3234,7 +3434,7 @@
           <p:spPr>
             <a:xfrm>
               <a:off x="3211921" y="391283"/>
-              <a:ext cx="316112" cy="240066"/>
+              <a:ext cx="322524" cy="246221"/>
             </a:xfrm>
             <a:prstGeom prst="rect">
               <a:avLst/>
@@ -3248,7 +3448,7 @@
             <a:lstStyle/>
             <a:p>
               <a:r>
-                <a:rPr lang="en-US" sz="960" b="1" dirty="0"/>
+                <a:rPr lang="en-US" sz="1000" b="1" dirty="0"/>
                 <a:t>XY</a:t>
               </a:r>
             </a:p>
@@ -3263,7 +3463,7 @@
           <p:spPr>
             <a:xfrm>
               <a:off x="2794321" y="708876"/>
-              <a:ext cx="251992" cy="240066"/>
+              <a:ext cx="255198" cy="246221"/>
             </a:xfrm>
             <a:prstGeom prst="rect">
               <a:avLst/>
@@ -3277,7 +3477,7 @@
             <a:lstStyle/>
             <a:p>
               <a:r>
-                <a:rPr lang="en-US" sz="960" b="1" dirty="0"/>
+                <a:rPr lang="en-US" sz="1000" b="1" dirty="0"/>
                 <a:t>X</a:t>
               </a:r>
             </a:p>
@@ -3292,7 +3492,7 @@
           <p:spPr>
             <a:xfrm>
               <a:off x="3139921" y="708876"/>
-              <a:ext cx="251992" cy="240066"/>
+              <a:ext cx="255198" cy="246221"/>
             </a:xfrm>
             <a:prstGeom prst="rect">
               <a:avLst/>
@@ -3306,7 +3506,7 @@
             <a:lstStyle/>
             <a:p>
               <a:r>
-                <a:rPr lang="en-US" sz="960" b="1" dirty="0"/>
+                <a:rPr lang="en-US" sz="1000" b="1" dirty="0"/>
                 <a:t>X</a:t>
               </a:r>
             </a:p>
@@ -3321,7 +3521,7 @@
           <p:spPr>
             <a:xfrm>
               <a:off x="2761921" y="1065001"/>
-              <a:ext cx="319318" cy="240066"/>
+              <a:ext cx="325730" cy="246221"/>
             </a:xfrm>
             <a:prstGeom prst="rect">
               <a:avLst/>
@@ -3335,7 +3535,7 @@
             <a:lstStyle/>
             <a:p>
               <a:r>
-                <a:rPr lang="en-US" sz="960" b="1" dirty="0"/>
+                <a:rPr lang="en-US" sz="1000" b="1" dirty="0"/>
                 <a:t>XX</a:t>
               </a:r>
             </a:p>
@@ -3350,7 +3550,7 @@
           <p:spPr>
             <a:xfrm>
               <a:off x="3211131" y="1067884"/>
-              <a:ext cx="316112" cy="240066"/>
+              <a:ext cx="322524" cy="246221"/>
             </a:xfrm>
             <a:prstGeom prst="rect">
               <a:avLst/>
@@ -3364,7 +3564,7 @@
             <a:lstStyle/>
             <a:p>
               <a:r>
-                <a:rPr lang="en-US" sz="960" b="1" dirty="0"/>
+                <a:rPr lang="en-US" sz="1000" b="1" dirty="0"/>
                 <a:t>XY</a:t>
               </a:r>
             </a:p>
@@ -3512,7 +3712,7 @@
           <p:spPr>
             <a:xfrm>
               <a:off x="4248721" y="185106"/>
-              <a:ext cx="308098" cy="240066"/>
+              <a:ext cx="312906" cy="246221"/>
             </a:xfrm>
             <a:prstGeom prst="rect">
               <a:avLst/>
@@ -3526,7 +3726,7 @@
             <a:lstStyle/>
             <a:p>
               <a:r>
-                <a:rPr lang="en-US" sz="960" b="1" dirty="0"/>
+                <a:rPr lang="en-US" sz="1000" b="1" dirty="0"/>
                 <a:t>♂</a:t>
               </a:r>
             </a:p>
@@ -3541,7 +3741,7 @@
           <p:spPr>
             <a:xfrm>
               <a:off x="3791521" y="185107"/>
-              <a:ext cx="308098" cy="240066"/>
+              <a:ext cx="312906" cy="246221"/>
             </a:xfrm>
             <a:prstGeom prst="rect">
               <a:avLst/>
@@ -3555,7 +3755,7 @@
             <a:lstStyle/>
             <a:p>
               <a:r>
-                <a:rPr lang="en-US" sz="960" b="1" dirty="0"/>
+                <a:rPr lang="en-US" sz="1000" b="1" dirty="0"/>
                 <a:t>♀</a:t>
               </a:r>
             </a:p>
@@ -3570,7 +3770,7 @@
           <p:spPr>
             <a:xfrm>
               <a:off x="3769921" y="390056"/>
-              <a:ext cx="356188" cy="240066"/>
+              <a:ext cx="362600" cy="246221"/>
             </a:xfrm>
             <a:prstGeom prst="rect">
               <a:avLst/>
@@ -3584,7 +3784,7 @@
             <a:lstStyle/>
             <a:p>
               <a:r>
-                <a:rPr lang="en-US" sz="960" b="1" dirty="0"/>
+                <a:rPr lang="en-US" sz="1000" b="1" dirty="0"/>
                 <a:t>ZW</a:t>
               </a:r>
             </a:p>
@@ -3599,7 +3799,7 @@
           <p:spPr>
             <a:xfrm>
               <a:off x="4252402" y="391281"/>
-              <a:ext cx="303288" cy="240066"/>
+              <a:ext cx="306494" cy="246221"/>
             </a:xfrm>
             <a:prstGeom prst="rect">
               <a:avLst/>
@@ -3613,7 +3813,7 @@
             <a:lstStyle/>
             <a:p>
               <a:r>
-                <a:rPr lang="en-US" sz="960" b="1" dirty="0"/>
+                <a:rPr lang="en-US" sz="1000" b="1" dirty="0"/>
                 <a:t>ZZ</a:t>
               </a:r>
             </a:p>
@@ -3628,7 +3828,7 @@
           <p:spPr>
             <a:xfrm>
               <a:off x="3771877" y="1070863"/>
-              <a:ext cx="356188" cy="240066"/>
+              <a:ext cx="362600" cy="246221"/>
             </a:xfrm>
             <a:prstGeom prst="rect">
               <a:avLst/>
@@ -3642,7 +3842,7 @@
             <a:lstStyle/>
             <a:p>
               <a:r>
-                <a:rPr lang="en-US" sz="960" b="1" dirty="0"/>
+                <a:rPr lang="en-US" sz="1000" b="1" dirty="0"/>
                 <a:t>ZW</a:t>
               </a:r>
             </a:p>
@@ -3657,7 +3857,7 @@
           <p:spPr>
             <a:xfrm>
               <a:off x="4252402" y="1076766"/>
-              <a:ext cx="303288" cy="240066"/>
+              <a:ext cx="306494" cy="246221"/>
             </a:xfrm>
             <a:prstGeom prst="rect">
               <a:avLst/>
@@ -3671,7 +3871,7 @@
             <a:lstStyle/>
             <a:p>
               <a:r>
-                <a:rPr lang="en-US" sz="960" b="1" dirty="0"/>
+                <a:rPr lang="en-US" sz="1000" b="1" dirty="0"/>
                 <a:t>ZZ</a:t>
               </a:r>
             </a:p>
@@ -3866,7 +4066,7 @@
           <p:spPr>
             <a:xfrm>
               <a:off x="4274488" y="683750"/>
-              <a:ext cx="243978" cy="240066"/>
+              <a:ext cx="245580" cy="246221"/>
             </a:xfrm>
             <a:prstGeom prst="rect">
               <a:avLst/>
@@ -3880,7 +4080,7 @@
             <a:lstStyle/>
             <a:p>
               <a:r>
-                <a:rPr lang="en-US" sz="960" b="1" dirty="0"/>
+                <a:rPr lang="en-US" sz="1000" b="1" dirty="0"/>
                 <a:t>Z</a:t>
               </a:r>
             </a:p>
@@ -4002,8 +4202,8 @@
           </p:nvSpPr>
           <p:spPr>
             <a:xfrm>
-              <a:off x="4579584" y="400398"/>
-              <a:ext cx="678391" cy="200055"/>
+              <a:off x="4570339" y="381181"/>
+              <a:ext cx="862737" cy="240066"/>
             </a:xfrm>
             <a:prstGeom prst="rect">
               <a:avLst/>
@@ -4017,7 +4217,7 @@
             <a:lstStyle/>
             <a:p>
               <a:r>
-                <a:rPr lang="en-US" sz="700" dirty="0"/>
+                <a:rPr lang="en-US" sz="960" dirty="0"/>
                 <a:t>diploid adults</a:t>
               </a:r>
             </a:p>
@@ -4031,8 +4231,8 @@
           </p:nvSpPr>
           <p:spPr>
             <a:xfrm>
-              <a:off x="4579921" y="683750"/>
-              <a:ext cx="708848" cy="307777"/>
+              <a:off x="4570339" y="596075"/>
+              <a:ext cx="933269" cy="400110"/>
             </a:xfrm>
             <a:prstGeom prst="rect">
               <a:avLst/>
@@ -4046,13 +4246,13 @@
             <a:lstStyle/>
             <a:p>
               <a:r>
-                <a:rPr lang="en-US" sz="700" dirty="0"/>
+                <a:rPr lang="en-US" sz="1000" dirty="0"/>
                 <a:t>gametes/</a:t>
               </a:r>
             </a:p>
             <a:p>
               <a:r>
-                <a:rPr lang="en-US" sz="700" dirty="0"/>
+                <a:rPr lang="en-US" sz="1000" dirty="0"/>
                 <a:t>gametophytes</a:t>
               </a:r>
             </a:p>
@@ -4066,8 +4266,8 @@
           </p:nvSpPr>
           <p:spPr>
             <a:xfrm>
-              <a:off x="4578259" y="1073598"/>
-              <a:ext cx="460382" cy="200055"/>
+              <a:off x="4569642" y="1051829"/>
+              <a:ext cx="579005" cy="246221"/>
             </a:xfrm>
             <a:prstGeom prst="rect">
               <a:avLst/>
@@ -4081,7 +4281,7 @@
             <a:lstStyle/>
             <a:p>
               <a:r>
-                <a:rPr lang="en-US" sz="700" dirty="0"/>
+                <a:rPr lang="en-US" sz="1000" dirty="0"/>
                 <a:t>zygotes</a:t>
               </a:r>
             </a:p>
@@ -4132,7 +4332,7 @@
           <p:spPr>
             <a:xfrm>
               <a:off x="3355921" y="703032"/>
-              <a:ext cx="248786" cy="240066"/>
+              <a:ext cx="251992" cy="246221"/>
             </a:xfrm>
             <a:prstGeom prst="rect">
               <a:avLst/>
@@ -4146,7 +4346,7 @@
             <a:lstStyle/>
             <a:p>
               <a:r>
-                <a:rPr lang="en-US" sz="960" b="1" dirty="0"/>
+                <a:rPr lang="en-US" sz="1000" b="1" dirty="0"/>
                 <a:t>Y</a:t>
               </a:r>
             </a:p>
@@ -4523,206 +4723,6 @@
             </a:fontRef>
           </p:style>
         </p:cxnSp>
-        <p:sp>
-          <p:nvSpPr>
-            <p:cNvPr id="366" name="Rounded Rectangle 365"/>
-            <p:cNvSpPr/>
-            <p:nvPr/>
-          </p:nvSpPr>
-          <p:spPr>
-            <a:xfrm>
-              <a:off x="2726138" y="1059497"/>
-              <a:ext cx="396153" cy="254814"/>
-            </a:xfrm>
-            <a:prstGeom prst="roundRect">
-              <a:avLst>
-                <a:gd name="adj" fmla="val 23718"/>
-              </a:avLst>
-            </a:prstGeom>
-            <a:solidFill>
-              <a:srgbClr val="7030A0">
-                <a:alpha val="30000"/>
-              </a:srgbClr>
-            </a:solidFill>
-            <a:ln>
-              <a:noFill/>
-            </a:ln>
-          </p:spPr>
-          <p:style>
-            <a:lnRef idx="2">
-              <a:schemeClr val="accent1">
-                <a:shade val="50000"/>
-              </a:schemeClr>
-            </a:lnRef>
-            <a:fillRef idx="1">
-              <a:schemeClr val="accent1"/>
-            </a:fillRef>
-            <a:effectRef idx="0">
-              <a:schemeClr val="accent1"/>
-            </a:effectRef>
-            <a:fontRef idx="minor">
-              <a:schemeClr val="lt1"/>
-            </a:fontRef>
-          </p:style>
-          <p:txBody>
-            <a:bodyPr rtlCol="0" anchor="ctr"/>
-            <a:lstStyle/>
-            <a:p>
-              <a:pPr algn="ctr"/>
-              <a:endParaRPr lang="en-US" sz="389"/>
-            </a:p>
-          </p:txBody>
-        </p:sp>
-        <p:sp>
-          <p:nvSpPr>
-            <p:cNvPr id="367" name="Rounded Rectangle 366"/>
-            <p:cNvSpPr/>
-            <p:nvPr/>
-          </p:nvSpPr>
-          <p:spPr>
-            <a:xfrm>
-              <a:off x="3162247" y="1059498"/>
-              <a:ext cx="396153" cy="251432"/>
-            </a:xfrm>
-            <a:prstGeom prst="roundRect">
-              <a:avLst>
-                <a:gd name="adj" fmla="val 23718"/>
-              </a:avLst>
-            </a:prstGeom>
-            <a:solidFill>
-              <a:srgbClr val="00B050">
-                <a:alpha val="30000"/>
-              </a:srgbClr>
-            </a:solidFill>
-            <a:ln>
-              <a:noFill/>
-            </a:ln>
-          </p:spPr>
-          <p:style>
-            <a:lnRef idx="2">
-              <a:schemeClr val="accent1">
-                <a:shade val="50000"/>
-              </a:schemeClr>
-            </a:lnRef>
-            <a:fillRef idx="1">
-              <a:schemeClr val="accent1"/>
-            </a:fillRef>
-            <a:effectRef idx="0">
-              <a:schemeClr val="accent1"/>
-            </a:effectRef>
-            <a:fontRef idx="minor">
-              <a:schemeClr val="lt1"/>
-            </a:fontRef>
-          </p:style>
-          <p:txBody>
-            <a:bodyPr rtlCol="0" anchor="ctr"/>
-            <a:lstStyle/>
-            <a:p>
-              <a:pPr algn="ctr"/>
-              <a:endParaRPr lang="en-US" sz="389"/>
-            </a:p>
-          </p:txBody>
-        </p:sp>
-        <p:sp>
-          <p:nvSpPr>
-            <p:cNvPr id="368" name="Rounded Rectangle 367"/>
-            <p:cNvSpPr/>
-            <p:nvPr/>
-          </p:nvSpPr>
-          <p:spPr>
-            <a:xfrm>
-              <a:off x="4199263" y="1059497"/>
-              <a:ext cx="396153" cy="254813"/>
-            </a:xfrm>
-            <a:prstGeom prst="roundRect">
-              <a:avLst>
-                <a:gd name="adj" fmla="val 23718"/>
-              </a:avLst>
-            </a:prstGeom>
-            <a:solidFill>
-              <a:srgbClr val="00B050">
-                <a:alpha val="30000"/>
-              </a:srgbClr>
-            </a:solidFill>
-            <a:ln>
-              <a:noFill/>
-            </a:ln>
-          </p:spPr>
-          <p:style>
-            <a:lnRef idx="2">
-              <a:schemeClr val="accent1">
-                <a:shade val="50000"/>
-              </a:schemeClr>
-            </a:lnRef>
-            <a:fillRef idx="1">
-              <a:schemeClr val="accent1"/>
-            </a:fillRef>
-            <a:effectRef idx="0">
-              <a:schemeClr val="accent1"/>
-            </a:effectRef>
-            <a:fontRef idx="minor">
-              <a:schemeClr val="lt1"/>
-            </a:fontRef>
-          </p:style>
-          <p:txBody>
-            <a:bodyPr rtlCol="0" anchor="ctr"/>
-            <a:lstStyle/>
-            <a:p>
-              <a:pPr algn="ctr"/>
-              <a:endParaRPr lang="en-US" sz="389"/>
-            </a:p>
-          </p:txBody>
-        </p:sp>
-        <p:sp>
-          <p:nvSpPr>
-            <p:cNvPr id="369" name="Rounded Rectangle 368"/>
-            <p:cNvSpPr/>
-            <p:nvPr/>
-          </p:nvSpPr>
-          <p:spPr>
-            <a:xfrm>
-              <a:off x="3748321" y="1059495"/>
-              <a:ext cx="396153" cy="254815"/>
-            </a:xfrm>
-            <a:prstGeom prst="roundRect">
-              <a:avLst>
-                <a:gd name="adj" fmla="val 23718"/>
-              </a:avLst>
-            </a:prstGeom>
-            <a:solidFill>
-              <a:srgbClr val="7030A0">
-                <a:alpha val="30000"/>
-              </a:srgbClr>
-            </a:solidFill>
-            <a:ln>
-              <a:noFill/>
-            </a:ln>
-          </p:spPr>
-          <p:style>
-            <a:lnRef idx="2">
-              <a:schemeClr val="accent1">
-                <a:shade val="50000"/>
-              </a:schemeClr>
-            </a:lnRef>
-            <a:fillRef idx="1">
-              <a:schemeClr val="accent1"/>
-            </a:fillRef>
-            <a:effectRef idx="0">
-              <a:schemeClr val="accent1"/>
-            </a:effectRef>
-            <a:fontRef idx="minor">
-              <a:schemeClr val="lt1"/>
-            </a:fontRef>
-          </p:style>
-          <p:txBody>
-            <a:bodyPr rtlCol="0" anchor="ctr"/>
-            <a:lstStyle/>
-            <a:p>
-              <a:pPr algn="ctr"/>
-              <a:endParaRPr lang="en-US" sz="389"/>
-            </a:p>
-          </p:txBody>
-        </p:sp>
       </p:grpSp>
       <p:grpSp>
         <p:nvGrpSpPr>
@@ -4776,8 +4776,8 @@
           </p:nvSpPr>
           <p:spPr>
             <a:xfrm>
-              <a:off x="3528356" y="3512725"/>
-              <a:ext cx="378630" cy="246221"/>
+              <a:off x="3525952" y="3512725"/>
+              <a:ext cx="383438" cy="246221"/>
             </a:xfrm>
             <a:prstGeom prst="rect">
               <a:avLst/>
@@ -4792,8 +4792,16 @@
             <a:p>
               <a:pPr algn="ctr"/>
               <a:r>
+                <a:rPr lang="en-US" sz="1000" b="1" i="1" dirty="0"/>
+                <a:t>A</a:t>
+              </a:r>
+              <a:r>
                 <a:rPr lang="en-US" sz="1000" b="1" dirty="0"/>
-                <a:t>A/a</a:t>
+                <a:t>/</a:t>
+              </a:r>
+              <a:r>
+                <a:rPr lang="en-US" sz="1000" b="1" i="1" dirty="0"/>
+                <a:t>a</a:t>
               </a:r>
             </a:p>
           </p:txBody>
@@ -4822,8 +4830,16 @@
             <a:p>
               <a:pPr algn="ctr"/>
               <a:r>
+                <a:rPr lang="en-US" sz="1000" b="1" i="1" dirty="0"/>
+                <a:t>M</a:t>
+              </a:r>
+              <a:r>
                 <a:rPr lang="en-US" sz="1000" b="1" dirty="0"/>
-                <a:t>M/m</a:t>
+                <a:t>/</a:t>
+              </a:r>
+              <a:r>
+                <a:rPr lang="en-US" sz="1000" b="1" i="1" dirty="0"/>
+                <a:t>m</a:t>
               </a:r>
             </a:p>
           </p:txBody>
@@ -5180,10 +5196,10 @@
         </p:nvGrpSpPr>
         <p:grpSpPr>
           <a:xfrm>
-            <a:off x="95517" y="1428380"/>
-            <a:ext cx="4523710" cy="2030277"/>
-            <a:chOff x="280510" y="1501708"/>
-            <a:chExt cx="4523710" cy="2030277"/>
+            <a:off x="24984" y="1423647"/>
+            <a:ext cx="4652331" cy="2035010"/>
+            <a:chOff x="209977" y="1496975"/>
+            <a:chExt cx="4652331" cy="2035010"/>
           </a:xfrm>
         </p:grpSpPr>
         <p:sp>
@@ -5494,8 +5510,8 @@
           </p:nvSpPr>
           <p:spPr>
             <a:xfrm>
-              <a:off x="1603505" y="2447158"/>
-              <a:ext cx="409086" cy="400110"/>
+              <a:off x="1534576" y="2447158"/>
+              <a:ext cx="546945" cy="400110"/>
             </a:xfrm>
             <a:prstGeom prst="rect">
               <a:avLst/>
@@ -5511,13 +5527,17 @@
               <a:pPr algn="ctr"/>
               <a:r>
                 <a:rPr lang="en-US" sz="1000" b="1" dirty="0"/>
+                <a:t>♂</a:t>
+              </a:r>
+            </a:p>
+            <a:p>
+              <a:pPr algn="ctr"/>
+              <a:r>
+                <a:rPr lang="en-US" sz="1000" b="1" dirty="0"/>
                 <a:t>XY</a:t>
               </a:r>
-            </a:p>
-            <a:p>
-              <a:pPr algn="ctr"/>
-              <a:r>
-                <a:rPr lang="en-US" sz="1000" b="1" dirty="0"/>
+              <a:r>
+                <a:rPr lang="en-US" sz="1000" b="1" i="1" dirty="0"/>
                 <a:t>MM</a:t>
               </a:r>
             </a:p>
@@ -5581,8 +5601,8 @@
           </p:nvSpPr>
           <p:spPr>
             <a:xfrm>
-              <a:off x="1160527" y="2447396"/>
-              <a:ext cx="401072" cy="400110"/>
+              <a:off x="1091598" y="2447396"/>
+              <a:ext cx="538929" cy="400110"/>
             </a:xfrm>
             <a:prstGeom prst="rect">
               <a:avLst/>
@@ -5598,15 +5618,20 @@
               <a:pPr algn="ctr"/>
               <a:r>
                 <a:rPr lang="en-US" sz="1000" b="1" dirty="0"/>
+                <a:t>♂</a:t>
+              </a:r>
+            </a:p>
+            <a:p>
+              <a:pPr algn="ctr"/>
+              <a:r>
+                <a:rPr lang="en-US" sz="1000" b="1" dirty="0" err="1"/>
                 <a:t>XY</a:t>
               </a:r>
-            </a:p>
-            <a:p>
-              <a:pPr algn="ctr"/>
-              <a:r>
-                <a:rPr lang="en-US" sz="1000" b="1" dirty="0"/>
+              <a:r>
+                <a:rPr lang="en-US" sz="1000" b="1" i="1" dirty="0" err="1"/>
                 <a:t>Mm</a:t>
               </a:r>
+              <a:endParaRPr lang="en-US" sz="1000" b="1" i="1" dirty="0"/>
             </a:p>
           </p:txBody>
         </p:sp>
@@ -5618,8 +5643,8 @@
           </p:nvSpPr>
           <p:spPr>
             <a:xfrm>
-              <a:off x="280510" y="2441805"/>
-              <a:ext cx="409086" cy="400110"/>
+              <a:off x="209977" y="2441805"/>
+              <a:ext cx="550151" cy="400110"/>
             </a:xfrm>
             <a:prstGeom prst="rect">
               <a:avLst/>
@@ -5635,13 +5660,17 @@
               <a:pPr algn="ctr"/>
               <a:r>
                 <a:rPr lang="en-US" sz="1000" b="1" dirty="0"/>
+                <a:t>♀</a:t>
+              </a:r>
+            </a:p>
+            <a:p>
+              <a:pPr algn="ctr"/>
+              <a:r>
+                <a:rPr lang="en-US" sz="1000" b="1" dirty="0"/>
                 <a:t>XX</a:t>
               </a:r>
-            </a:p>
-            <a:p>
-              <a:pPr algn="ctr"/>
-              <a:r>
-                <a:rPr lang="en-US" sz="1000" b="1" dirty="0"/>
+              <a:r>
+                <a:rPr lang="en-US" sz="1000" b="1" i="1" dirty="0"/>
                 <a:t>MM</a:t>
               </a:r>
             </a:p>
@@ -5705,8 +5734,8 @@
           </p:nvSpPr>
           <p:spPr>
             <a:xfrm>
-              <a:off x="4384292" y="2439643"/>
-              <a:ext cx="409086" cy="400110"/>
+              <a:off x="4315363" y="2439643"/>
+              <a:ext cx="546945" cy="400110"/>
             </a:xfrm>
             <a:prstGeom prst="rect">
               <a:avLst/>
@@ -5722,13 +5751,17 @@
               <a:pPr algn="ctr"/>
               <a:r>
                 <a:rPr lang="en-US" sz="1000" b="1" dirty="0"/>
+                <a:t>♂</a:t>
+              </a:r>
+            </a:p>
+            <a:p>
+              <a:pPr algn="ctr"/>
+              <a:r>
+                <a:rPr lang="en-US" sz="1000" b="1" dirty="0"/>
                 <a:t>XY</a:t>
               </a:r>
-            </a:p>
-            <a:p>
-              <a:pPr algn="ctr"/>
-              <a:r>
-                <a:rPr lang="en-US" sz="1000" b="1" dirty="0"/>
+              <a:r>
+                <a:rPr lang="en-US" sz="1000" b="1" i="1" dirty="0"/>
                 <a:t>MM</a:t>
               </a:r>
             </a:p>
@@ -5792,8 +5825,8 @@
           </p:nvSpPr>
           <p:spPr>
             <a:xfrm>
-              <a:off x="3939600" y="2442484"/>
-              <a:ext cx="409086" cy="400110"/>
+              <a:off x="3872273" y="2442484"/>
+              <a:ext cx="543739" cy="400110"/>
             </a:xfrm>
             <a:prstGeom prst="rect">
               <a:avLst/>
@@ -5809,13 +5842,17 @@
               <a:pPr algn="ctr"/>
               <a:r>
                 <a:rPr lang="en-US" sz="1000" b="1" dirty="0"/>
+                <a:t>♂</a:t>
+              </a:r>
+            </a:p>
+            <a:p>
+              <a:pPr algn="ctr"/>
+              <a:r>
+                <a:rPr lang="en-US" sz="1000" b="1" dirty="0"/>
                 <a:t>YY</a:t>
               </a:r>
-            </a:p>
-            <a:p>
-              <a:pPr algn="ctr"/>
-              <a:r>
-                <a:rPr lang="en-US" sz="1000" b="1" dirty="0"/>
+              <a:r>
+                <a:rPr lang="en-US" sz="1000" b="1" i="1" dirty="0"/>
                 <a:t>MM</a:t>
               </a:r>
             </a:p>
@@ -5829,8 +5866,8 @@
           </p:nvSpPr>
           <p:spPr>
             <a:xfrm>
-              <a:off x="2155337" y="2447158"/>
-              <a:ext cx="409086" cy="400110"/>
+              <a:off x="2084804" y="2447158"/>
+              <a:ext cx="550151" cy="400110"/>
             </a:xfrm>
             <a:prstGeom prst="rect">
               <a:avLst/>
@@ -5846,13 +5883,17 @@
               <a:pPr algn="ctr"/>
               <a:r>
                 <a:rPr lang="en-US" sz="1000" b="1" dirty="0"/>
+                <a:t>♀</a:t>
+              </a:r>
+            </a:p>
+            <a:p>
+              <a:pPr algn="ctr"/>
+              <a:r>
+                <a:rPr lang="en-US" sz="1000" b="1" dirty="0"/>
                 <a:t>XX</a:t>
               </a:r>
-            </a:p>
-            <a:p>
-              <a:pPr algn="ctr"/>
-              <a:r>
-                <a:rPr lang="en-US" sz="1000" b="1" dirty="0"/>
+              <a:r>
+                <a:rPr lang="en-US" sz="1000" b="1" i="1" dirty="0"/>
                 <a:t>MM</a:t>
               </a:r>
             </a:p>
@@ -5866,8 +5907,8 @@
           </p:nvSpPr>
           <p:spPr>
             <a:xfrm>
-              <a:off x="2607230" y="2442247"/>
-              <a:ext cx="401072" cy="400110"/>
+              <a:off x="2536698" y="2442247"/>
+              <a:ext cx="542135" cy="400110"/>
             </a:xfrm>
             <a:prstGeom prst="rect">
               <a:avLst/>
@@ -5883,15 +5924,20 @@
               <a:pPr algn="ctr"/>
               <a:r>
                 <a:rPr lang="en-US" sz="1000" b="1" dirty="0"/>
+                <a:t>♀</a:t>
+              </a:r>
+            </a:p>
+            <a:p>
+              <a:pPr algn="ctr"/>
+              <a:r>
+                <a:rPr lang="en-US" sz="1000" b="1" dirty="0" err="1"/>
                 <a:t>XX</a:t>
               </a:r>
-            </a:p>
-            <a:p>
-              <a:pPr algn="ctr"/>
-              <a:r>
-                <a:rPr lang="en-US" sz="1000" b="1" dirty="0"/>
+              <a:r>
+                <a:rPr lang="en-US" sz="1000" b="1" i="1" dirty="0" err="1"/>
                 <a:t>Mm</a:t>
               </a:r>
+              <a:endParaRPr lang="en-US" sz="1000" b="1" i="1" dirty="0"/>
             </a:p>
           </p:txBody>
         </p:sp>
@@ -5903,8 +5949,8 @@
           </p:nvSpPr>
           <p:spPr>
             <a:xfrm>
-              <a:off x="3045615" y="2442247"/>
-              <a:ext cx="401072" cy="400110"/>
+              <a:off x="2976686" y="2442247"/>
+              <a:ext cx="538929" cy="400110"/>
             </a:xfrm>
             <a:prstGeom prst="rect">
               <a:avLst/>
@@ -5920,15 +5966,20 @@
               <a:pPr algn="ctr"/>
               <a:r>
                 <a:rPr lang="en-US" sz="1000" b="1" dirty="0"/>
+                <a:t>♀</a:t>
+              </a:r>
+            </a:p>
+            <a:p>
+              <a:pPr algn="ctr"/>
+              <a:r>
+                <a:rPr lang="en-US" sz="1000" b="1" dirty="0" err="1"/>
                 <a:t>XY</a:t>
               </a:r>
-            </a:p>
-            <a:p>
-              <a:pPr algn="ctr"/>
-              <a:r>
-                <a:rPr lang="en-US" sz="1000" b="1" dirty="0"/>
+              <a:r>
+                <a:rPr lang="en-US" sz="1000" b="1" i="1" dirty="0" err="1"/>
                 <a:t>Mm</a:t>
               </a:r>
+              <a:endParaRPr lang="en-US" sz="1000" b="1" i="1" dirty="0"/>
             </a:p>
           </p:txBody>
         </p:sp>
@@ -5940,8 +5991,8 @@
           </p:nvSpPr>
           <p:spPr>
             <a:xfrm>
-              <a:off x="3488934" y="2439643"/>
-              <a:ext cx="401072" cy="400110"/>
+              <a:off x="3421608" y="2439643"/>
+              <a:ext cx="535723" cy="400110"/>
             </a:xfrm>
             <a:prstGeom prst="rect">
               <a:avLst/>
@@ -5957,15 +6008,20 @@
               <a:pPr algn="ctr"/>
               <a:r>
                 <a:rPr lang="en-US" sz="1000" b="1" dirty="0"/>
+                <a:t>♀</a:t>
+              </a:r>
+            </a:p>
+            <a:p>
+              <a:pPr algn="ctr"/>
+              <a:r>
+                <a:rPr lang="en-US" sz="1000" b="1" dirty="0" err="1"/>
                 <a:t>YY</a:t>
               </a:r>
-            </a:p>
-            <a:p>
-              <a:pPr algn="ctr"/>
-              <a:r>
-                <a:rPr lang="en-US" sz="1000" b="1" dirty="0"/>
+              <a:r>
+                <a:rPr lang="en-US" sz="1000" b="1" i="1" dirty="0" err="1"/>
                 <a:t>Mm</a:t>
               </a:r>
+              <a:endParaRPr lang="en-US" sz="1000" b="1" i="1" dirty="0"/>
             </a:p>
           </p:txBody>
         </p:sp>
@@ -6027,8 +6083,8 @@
           </p:nvSpPr>
           <p:spPr>
             <a:xfrm>
-              <a:off x="719556" y="2442825"/>
-              <a:ext cx="401072" cy="400110"/>
+              <a:off x="649024" y="2442825"/>
+              <a:ext cx="542135" cy="400110"/>
             </a:xfrm>
             <a:prstGeom prst="rect">
               <a:avLst/>
@@ -6044,15 +6100,20 @@
               <a:pPr algn="ctr"/>
               <a:r>
                 <a:rPr lang="en-US" sz="1000" b="1" dirty="0"/>
+                <a:t>♂</a:t>
+              </a:r>
+            </a:p>
+            <a:p>
+              <a:pPr algn="ctr"/>
+              <a:r>
+                <a:rPr lang="en-US" sz="1000" b="1" dirty="0" err="1"/>
                 <a:t>XX</a:t>
               </a:r>
-            </a:p>
-            <a:p>
-              <a:pPr algn="ctr"/>
-              <a:r>
-                <a:rPr lang="en-US" sz="1000" b="1" dirty="0"/>
+              <a:r>
+                <a:rPr lang="en-US" sz="1000" b="1" i="1" dirty="0" err="1"/>
                 <a:t>Mm</a:t>
               </a:r>
+              <a:endParaRPr lang="en-US" sz="1000" b="1" i="1" dirty="0"/>
             </a:p>
           </p:txBody>
         </p:sp>
@@ -6186,8 +6247,8 @@
           </p:nvSpPr>
           <p:spPr>
             <a:xfrm>
-              <a:off x="699112" y="3131875"/>
-              <a:ext cx="409086" cy="400110"/>
+              <a:off x="628579" y="3131875"/>
+              <a:ext cx="550151" cy="400110"/>
             </a:xfrm>
             <a:prstGeom prst="rect">
               <a:avLst/>
@@ -6203,13 +6264,17 @@
               <a:pPr algn="ctr"/>
               <a:r>
                 <a:rPr lang="en-US" sz="1000" b="1" dirty="0"/>
+                <a:t>♀</a:t>
+              </a:r>
+            </a:p>
+            <a:p>
+              <a:pPr algn="ctr"/>
+              <a:r>
+                <a:rPr lang="en-US" sz="1000" b="1" dirty="0"/>
                 <a:t>XX</a:t>
               </a:r>
-            </a:p>
-            <a:p>
-              <a:pPr algn="ctr"/>
-              <a:r>
-                <a:rPr lang="en-US" sz="1000" b="1" dirty="0"/>
+              <a:r>
+                <a:rPr lang="en-US" sz="1000" b="1" i="1" dirty="0"/>
                 <a:t>MM</a:t>
               </a:r>
             </a:p>
@@ -6273,8 +6338,8 @@
           </p:nvSpPr>
           <p:spPr>
             <a:xfrm>
-              <a:off x="1406976" y="3129083"/>
-              <a:ext cx="401072" cy="400110"/>
+              <a:off x="1337246" y="3129083"/>
+              <a:ext cx="540533" cy="400110"/>
             </a:xfrm>
             <a:prstGeom prst="rect">
               <a:avLst/>
@@ -6290,15 +6355,20 @@
               <a:pPr algn="ctr"/>
               <a:r>
                 <a:rPr lang="en-US" sz="1000" b="1" dirty="0"/>
+                <a:t>♂</a:t>
+              </a:r>
+            </a:p>
+            <a:p>
+              <a:pPr algn="ctr"/>
+              <a:r>
+                <a:rPr lang="en-US" sz="1000" b="1" dirty="0" err="1"/>
                 <a:t>XX</a:t>
               </a:r>
-            </a:p>
-            <a:p>
-              <a:pPr algn="ctr"/>
-              <a:r>
-                <a:rPr lang="en-US" sz="1000" b="1" dirty="0"/>
+              <a:r>
+                <a:rPr lang="en-US" sz="1000" b="1" i="1" dirty="0" err="1"/>
                 <a:t>Mm</a:t>
               </a:r>
+              <a:endParaRPr lang="en-US" sz="1000" b="1" i="1" dirty="0"/>
             </a:p>
           </p:txBody>
         </p:sp>
@@ -6360,8 +6430,8 @@
           </p:nvSpPr>
           <p:spPr>
             <a:xfrm>
-              <a:off x="699112" y="1763070"/>
-              <a:ext cx="409086" cy="400110"/>
+              <a:off x="628579" y="1763070"/>
+              <a:ext cx="550151" cy="400110"/>
             </a:xfrm>
             <a:prstGeom prst="rect">
               <a:avLst/>
@@ -6377,13 +6447,17 @@
               <a:pPr algn="ctr"/>
               <a:r>
                 <a:rPr lang="en-US" sz="1000" b="1" dirty="0"/>
+                <a:t>♀</a:t>
+              </a:r>
+            </a:p>
+            <a:p>
+              <a:pPr algn="ctr"/>
+              <a:r>
+                <a:rPr lang="en-US" sz="1000" b="1" dirty="0"/>
                 <a:t>XX</a:t>
               </a:r>
-            </a:p>
-            <a:p>
-              <a:pPr algn="ctr"/>
-              <a:r>
-                <a:rPr lang="en-US" sz="1000" b="1" dirty="0"/>
+              <a:r>
+                <a:rPr lang="en-US" sz="1000" b="1" i="1" dirty="0"/>
                 <a:t>MM</a:t>
               </a:r>
             </a:p>
@@ -6447,8 +6521,8 @@
           </p:nvSpPr>
           <p:spPr>
             <a:xfrm>
-              <a:off x="1402969" y="1760278"/>
-              <a:ext cx="409086" cy="400110"/>
+              <a:off x="1334040" y="1760278"/>
+              <a:ext cx="546945" cy="400110"/>
             </a:xfrm>
             <a:prstGeom prst="rect">
               <a:avLst/>
@@ -6464,13 +6538,17 @@
               <a:pPr algn="ctr"/>
               <a:r>
                 <a:rPr lang="en-US" sz="1000" b="1" dirty="0"/>
+                <a:t>♂</a:t>
+              </a:r>
+            </a:p>
+            <a:p>
+              <a:pPr algn="ctr"/>
+              <a:r>
+                <a:rPr lang="en-US" sz="1000" b="1" dirty="0"/>
                 <a:t>XY</a:t>
               </a:r>
-            </a:p>
-            <a:p>
-              <a:pPr algn="ctr"/>
-              <a:r>
-                <a:rPr lang="en-US" sz="1000" b="1" dirty="0"/>
+              <a:r>
+                <a:rPr lang="en-US" sz="1000" b="1" i="1" dirty="0"/>
                 <a:t>MM</a:t>
               </a:r>
             </a:p>
@@ -6570,8 +6648,8 @@
           </p:nvSpPr>
           <p:spPr>
             <a:xfrm>
-              <a:off x="2903000" y="1763372"/>
-              <a:ext cx="409086" cy="400110"/>
+              <a:off x="2832467" y="1763372"/>
+              <a:ext cx="550151" cy="400110"/>
             </a:xfrm>
             <a:prstGeom prst="rect">
               <a:avLst/>
@@ -6587,13 +6665,17 @@
               <a:pPr algn="ctr"/>
               <a:r>
                 <a:rPr lang="en-US" sz="1000" b="1" dirty="0"/>
+                <a:t>♀</a:t>
+              </a:r>
+            </a:p>
+            <a:p>
+              <a:pPr algn="ctr"/>
+              <a:r>
+                <a:rPr lang="en-US" sz="1000" b="1" dirty="0"/>
                 <a:t>XX</a:t>
               </a:r>
-            </a:p>
-            <a:p>
-              <a:pPr algn="ctr"/>
-              <a:r>
-                <a:rPr lang="en-US" sz="1000" b="1" dirty="0"/>
+              <a:r>
+                <a:rPr lang="en-US" sz="1000" b="1" i="1" dirty="0"/>
                 <a:t>MM</a:t>
               </a:r>
             </a:p>
@@ -6657,8 +6739,8 @@
           </p:nvSpPr>
           <p:spPr>
             <a:xfrm>
-              <a:off x="3606857" y="1760580"/>
-              <a:ext cx="409086" cy="400110"/>
+              <a:off x="3537928" y="1760580"/>
+              <a:ext cx="546945" cy="400110"/>
             </a:xfrm>
             <a:prstGeom prst="rect">
               <a:avLst/>
@@ -6674,13 +6756,17 @@
               <a:pPr algn="ctr"/>
               <a:r>
                 <a:rPr lang="en-US" sz="1000" b="1" dirty="0"/>
+                <a:t>♂</a:t>
+              </a:r>
+            </a:p>
+            <a:p>
+              <a:pPr algn="ctr"/>
+              <a:r>
+                <a:rPr lang="en-US" sz="1000" b="1" dirty="0"/>
                 <a:t>XY</a:t>
               </a:r>
-            </a:p>
-            <a:p>
-              <a:pPr algn="ctr"/>
-              <a:r>
-                <a:rPr lang="en-US" sz="1000" b="1" dirty="0"/>
+              <a:r>
+                <a:rPr lang="en-US" sz="1000" b="1" i="1" dirty="0"/>
                 <a:t>MM</a:t>
               </a:r>
             </a:p>
@@ -6780,8 +6866,8 @@
           </p:nvSpPr>
           <p:spPr>
             <a:xfrm>
-              <a:off x="2907007" y="3128882"/>
-              <a:ext cx="401072" cy="400110"/>
+              <a:off x="2839681" y="3128882"/>
+              <a:ext cx="535723" cy="400110"/>
             </a:xfrm>
             <a:prstGeom prst="rect">
               <a:avLst/>
@@ -6797,15 +6883,20 @@
               <a:pPr algn="ctr"/>
               <a:r>
                 <a:rPr lang="en-US" sz="1000" b="1" dirty="0"/>
+                <a:t>♀</a:t>
+              </a:r>
+            </a:p>
+            <a:p>
+              <a:pPr algn="ctr"/>
+              <a:r>
+                <a:rPr lang="en-US" sz="1000" b="1" dirty="0" err="1"/>
                 <a:t>YY</a:t>
               </a:r>
-            </a:p>
-            <a:p>
-              <a:pPr algn="ctr"/>
-              <a:r>
-                <a:rPr lang="en-US" sz="1000" b="1" dirty="0"/>
+              <a:r>
+                <a:rPr lang="en-US" sz="1000" b="1" i="1" dirty="0" err="1"/>
                 <a:t>Mm</a:t>
               </a:r>
+              <a:endParaRPr lang="en-US" sz="1000" b="1" i="1" dirty="0"/>
             </a:p>
           </p:txBody>
         </p:sp>
@@ -6867,8 +6958,8 @@
           </p:nvSpPr>
           <p:spPr>
             <a:xfrm>
-              <a:off x="3606857" y="3126090"/>
-              <a:ext cx="409086" cy="400110"/>
+              <a:off x="3539530" y="3126090"/>
+              <a:ext cx="543739" cy="400110"/>
             </a:xfrm>
             <a:prstGeom prst="rect">
               <a:avLst/>
@@ -6884,13 +6975,17 @@
               <a:pPr algn="ctr"/>
               <a:r>
                 <a:rPr lang="en-US" sz="1000" b="1" dirty="0"/>
+                <a:t>♂</a:t>
+              </a:r>
+            </a:p>
+            <a:p>
+              <a:pPr algn="ctr"/>
+              <a:r>
+                <a:rPr lang="en-US" sz="1000" b="1" dirty="0"/>
                 <a:t>YY</a:t>
               </a:r>
-            </a:p>
-            <a:p>
-              <a:pPr algn="ctr"/>
-              <a:r>
-                <a:rPr lang="en-US" sz="1000" b="1" dirty="0"/>
+              <a:r>
+                <a:rPr lang="en-US" sz="1000" b="1" i="1" dirty="0"/>
                 <a:t>MM</a:t>
               </a:r>
             </a:p>
@@ -6904,8 +6999,8 @@
           </p:nvSpPr>
           <p:spPr>
             <a:xfrm>
-              <a:off x="3028279" y="1501708"/>
-              <a:ext cx="896399" cy="200055"/>
+              <a:off x="2900591" y="1498017"/>
+              <a:ext cx="1194558" cy="246221"/>
             </a:xfrm>
             <a:prstGeom prst="rect">
               <a:avLst/>
@@ -6919,8 +7014,12 @@
             <a:lstStyle/>
             <a:p>
               <a:r>
-                <a:rPr lang="en-US" sz="700" b="1" dirty="0"/>
-                <a:t>m allele is a neo-W</a:t>
+                <a:rPr lang="en-US" sz="1000" b="1" i="1" dirty="0"/>
+                <a:t>m</a:t>
+              </a:r>
+              <a:r>
+                <a:rPr lang="en-US" sz="1000" b="1" dirty="0"/>
+                <a:t> allele is a neo-W</a:t>
               </a:r>
             </a:p>
           </p:txBody>
@@ -6933,8 +7032,8 @@
           </p:nvSpPr>
           <p:spPr>
             <a:xfrm>
-              <a:off x="847406" y="1505996"/>
-              <a:ext cx="861133" cy="200055"/>
+              <a:off x="699112" y="1496975"/>
+              <a:ext cx="1144865" cy="246221"/>
             </a:xfrm>
             <a:prstGeom prst="rect">
               <a:avLst/>
@@ -6948,8 +7047,12 @@
             <a:lstStyle/>
             <a:p>
               <a:r>
-                <a:rPr lang="en-US" sz="700" b="1" dirty="0"/>
-                <a:t>m allele is a neo-Y</a:t>
+                <a:rPr lang="en-US" sz="1000" b="1" i="1" dirty="0"/>
+                <a:t>m</a:t>
+              </a:r>
+              <a:r>
+                <a:rPr lang="en-US" sz="1000" b="1" dirty="0"/>
+                <a:t> allele is a neo-Y</a:t>
               </a:r>
             </a:p>
           </p:txBody>
@@ -6963,8 +7066,8 @@
         </p:nvSpPr>
         <p:spPr>
           <a:xfrm>
-            <a:off x="-30480" y="3453"/>
-            <a:ext cx="247184" cy="246221"/>
+            <a:off x="-37694" y="3453"/>
+            <a:ext cx="261611" cy="246221"/>
           </a:xfrm>
           <a:prstGeom prst="rect">
             <a:avLst/>
@@ -6980,7 +7083,7 @@
             <a:pPr algn="ctr"/>
             <a:r>
               <a:rPr lang="en-US" sz="1000" b="1" dirty="0"/>
-              <a:t>a</a:t>
+              <a:t>A</a:t>
             </a:r>
           </a:p>
         </p:txBody>
@@ -6993,8 +7096,8 @@
         </p:nvSpPr>
         <p:spPr>
           <a:xfrm>
-            <a:off x="1754594" y="0"/>
-            <a:ext cx="253596" cy="246221"/>
+            <a:off x="1752991" y="0"/>
+            <a:ext cx="256802" cy="246221"/>
           </a:xfrm>
           <a:prstGeom prst="rect">
             <a:avLst/>
@@ -7010,7 +7113,7 @@
             <a:pPr algn="ctr"/>
             <a:r>
               <a:rPr lang="en-US" sz="1000" b="1" dirty="0"/>
-              <a:t>b</a:t>
+              <a:t>B</a:t>
             </a:r>
           </a:p>
         </p:txBody>
@@ -7023,8 +7126,8 @@
         </p:nvSpPr>
         <p:spPr>
           <a:xfrm>
-            <a:off x="-25529" y="1423530"/>
-            <a:ext cx="237566" cy="246221"/>
+            <a:off x="-32742" y="1423530"/>
+            <a:ext cx="251992" cy="246221"/>
           </a:xfrm>
           <a:prstGeom prst="rect">
             <a:avLst/>
@@ -7040,7 +7143,7 @@
             <a:pPr algn="ctr"/>
             <a:r>
               <a:rPr lang="en-US" sz="1000" b="1" dirty="0"/>
-              <a:t>c</a:t>
+              <a:t>C</a:t>
             </a:r>
           </a:p>
         </p:txBody>
@@ -7125,8 +7228,8 @@
         </p:nvSpPr>
         <p:spPr>
           <a:xfrm>
-            <a:off x="1933146" y="1423530"/>
-            <a:ext cx="253596" cy="246221"/>
+            <a:off x="1927536" y="1423530"/>
+            <a:ext cx="264816" cy="246221"/>
           </a:xfrm>
           <a:prstGeom prst="rect">
             <a:avLst/>
@@ -7142,7 +7245,7 @@
             <a:pPr algn="ctr"/>
             <a:r>
               <a:rPr lang="en-US" sz="1000" b="1" dirty="0"/>
-              <a:t>d</a:t>
+              <a:t>D</a:t>
             </a:r>
           </a:p>
         </p:txBody>

</xml_diff>